<commit_message>
successfull handling of key event
</commit_message>
<xml_diff>
--- a/Readme/Illustrations/illustrations.pptx
+++ b/Readme/Illustrations/illustrations.pptx
@@ -7,6 +7,7 @@
   <p:sldIdLst>
     <p:sldId id="256" r:id="rId2"/>
     <p:sldId id="257" r:id="rId3"/>
+    <p:sldId id="259" r:id="rId4"/>
   </p:sldIdLst>
   <p:sldSz cx="12192000" cy="6858000"/>
   <p:notesSz cx="6858000" cy="9144000"/>
@@ -105,6 +106,11 @@
       </a:defRPr>
     </a:lvl9pPr>
   </p:defaultTextStyle>
+  <p:extLst>
+    <p:ext uri="{EFAFB233-063F-42B5-8137-9DF3F51BA10A}">
+      <p15:sldGuideLst xmlns:p15="http://schemas.microsoft.com/office/powerpoint/2012/main"/>
+    </p:ext>
+  </p:extLst>
 </p:presentation>
 </file>
 
@@ -257,7 +263,7 @@
           <a:p>
             <a:fld id="{98EA7AB4-7529-4827-90A7-5D29E852DD0A}" type="datetimeFigureOut">
               <a:rPr lang="en-US" smtClean="0"/>
-              <a:t>5/24/2020</a:t>
+              <a:t>5/25/2020</a:t>
             </a:fld>
             <a:endParaRPr lang="en-US"/>
           </a:p>
@@ -457,7 +463,7 @@
           <a:p>
             <a:fld id="{98EA7AB4-7529-4827-90A7-5D29E852DD0A}" type="datetimeFigureOut">
               <a:rPr lang="en-US" smtClean="0"/>
-              <a:t>5/24/2020</a:t>
+              <a:t>5/25/2020</a:t>
             </a:fld>
             <a:endParaRPr lang="en-US"/>
           </a:p>
@@ -667,7 +673,7 @@
           <a:p>
             <a:fld id="{98EA7AB4-7529-4827-90A7-5D29E852DD0A}" type="datetimeFigureOut">
               <a:rPr lang="en-US" smtClean="0"/>
-              <a:t>5/24/2020</a:t>
+              <a:t>5/25/2020</a:t>
             </a:fld>
             <a:endParaRPr lang="en-US"/>
           </a:p>
@@ -867,7 +873,7 @@
           <a:p>
             <a:fld id="{98EA7AB4-7529-4827-90A7-5D29E852DD0A}" type="datetimeFigureOut">
               <a:rPr lang="en-US" smtClean="0"/>
-              <a:t>5/24/2020</a:t>
+              <a:t>5/25/2020</a:t>
             </a:fld>
             <a:endParaRPr lang="en-US"/>
           </a:p>
@@ -1143,7 +1149,7 @@
           <a:p>
             <a:fld id="{98EA7AB4-7529-4827-90A7-5D29E852DD0A}" type="datetimeFigureOut">
               <a:rPr lang="en-US" smtClean="0"/>
-              <a:t>5/24/2020</a:t>
+              <a:t>5/25/2020</a:t>
             </a:fld>
             <a:endParaRPr lang="en-US"/>
           </a:p>
@@ -1411,7 +1417,7 @@
           <a:p>
             <a:fld id="{98EA7AB4-7529-4827-90A7-5D29E852DD0A}" type="datetimeFigureOut">
               <a:rPr lang="en-US" smtClean="0"/>
-              <a:t>5/24/2020</a:t>
+              <a:t>5/25/2020</a:t>
             </a:fld>
             <a:endParaRPr lang="en-US"/>
           </a:p>
@@ -1826,7 +1832,7 @@
           <a:p>
             <a:fld id="{98EA7AB4-7529-4827-90A7-5D29E852DD0A}" type="datetimeFigureOut">
               <a:rPr lang="en-US" smtClean="0"/>
-              <a:t>5/24/2020</a:t>
+              <a:t>5/25/2020</a:t>
             </a:fld>
             <a:endParaRPr lang="en-US"/>
           </a:p>
@@ -1968,7 +1974,7 @@
           <a:p>
             <a:fld id="{98EA7AB4-7529-4827-90A7-5D29E852DD0A}" type="datetimeFigureOut">
               <a:rPr lang="en-US" smtClean="0"/>
-              <a:t>5/24/2020</a:t>
+              <a:t>5/25/2020</a:t>
             </a:fld>
             <a:endParaRPr lang="en-US"/>
           </a:p>
@@ -2081,7 +2087,7 @@
           <a:p>
             <a:fld id="{98EA7AB4-7529-4827-90A7-5D29E852DD0A}" type="datetimeFigureOut">
               <a:rPr lang="en-US" smtClean="0"/>
-              <a:t>5/24/2020</a:t>
+              <a:t>5/25/2020</a:t>
             </a:fld>
             <a:endParaRPr lang="en-US"/>
           </a:p>
@@ -2394,7 +2400,7 @@
           <a:p>
             <a:fld id="{98EA7AB4-7529-4827-90A7-5D29E852DD0A}" type="datetimeFigureOut">
               <a:rPr lang="en-US" smtClean="0"/>
-              <a:t>5/24/2020</a:t>
+              <a:t>5/25/2020</a:t>
             </a:fld>
             <a:endParaRPr lang="en-US"/>
           </a:p>
@@ -2683,7 +2689,7 @@
           <a:p>
             <a:fld id="{98EA7AB4-7529-4827-90A7-5D29E852DD0A}" type="datetimeFigureOut">
               <a:rPr lang="en-US" smtClean="0"/>
-              <a:t>5/24/2020</a:t>
+              <a:t>5/25/2020</a:t>
             </a:fld>
             <a:endParaRPr lang="en-US"/>
           </a:p>
@@ -2926,7 +2932,7 @@
           <a:p>
             <a:fld id="{98EA7AB4-7529-4827-90A7-5D29E852DD0A}" type="datetimeFigureOut">
               <a:rPr lang="en-US" smtClean="0"/>
-              <a:t>5/24/2020</a:t>
+              <a:t>5/25/2020</a:t>
             </a:fld>
             <a:endParaRPr lang="en-US"/>
           </a:p>
@@ -7769,6 +7775,2686 @@
 </p:sld>
 </file>
 
+<file path=ppt/slides/slide3.xml><?xml version="1.0" encoding="utf-8"?>
+<p:sld xmlns:a="http://schemas.openxmlformats.org/drawingml/2006/main" xmlns:r="http://schemas.openxmlformats.org/officeDocument/2006/relationships" xmlns:p="http://schemas.openxmlformats.org/presentationml/2006/main">
+  <p:cSld>
+    <p:spTree>
+      <p:nvGrpSpPr>
+        <p:cNvPr id="1" name=""/>
+        <p:cNvGrpSpPr/>
+        <p:nvPr/>
+      </p:nvGrpSpPr>
+      <p:grpSpPr>
+        <a:xfrm>
+          <a:off x="0" y="0"/>
+          <a:ext cx="0" cy="0"/>
+          <a:chOff x="0" y="0"/>
+          <a:chExt cx="0" cy="0"/>
+        </a:xfrm>
+      </p:grpSpPr>
+      <p:sp>
+        <p:nvSpPr>
+          <p:cNvPr id="24" name="Rectangle 23">
+            <a:extLst>
+              <a:ext uri="{FF2B5EF4-FFF2-40B4-BE49-F238E27FC236}">
+                <a16:creationId xmlns:a16="http://schemas.microsoft.com/office/drawing/2014/main" id="{D85F2D76-902C-46BD-83AB-BE469C8206AA}"/>
+              </a:ext>
+            </a:extLst>
+          </p:cNvPr>
+          <p:cNvSpPr/>
+          <p:nvPr/>
+        </p:nvSpPr>
+        <p:spPr>
+          <a:xfrm>
+            <a:off x="2437752" y="3125522"/>
+            <a:ext cx="1481855" cy="1073616"/>
+          </a:xfrm>
+          <a:prstGeom prst="rect">
+            <a:avLst/>
+          </a:prstGeom>
+          <a:solidFill>
+            <a:schemeClr val="bg1"/>
+          </a:solidFill>
+          <a:ln>
+            <a:solidFill>
+              <a:schemeClr val="tx1"/>
+            </a:solidFill>
+          </a:ln>
+        </p:spPr>
+        <p:style>
+          <a:lnRef idx="2">
+            <a:schemeClr val="accent1">
+              <a:shade val="50000"/>
+            </a:schemeClr>
+          </a:lnRef>
+          <a:fillRef idx="1">
+            <a:schemeClr val="accent1"/>
+          </a:fillRef>
+          <a:effectRef idx="0">
+            <a:schemeClr val="accent1"/>
+          </a:effectRef>
+          <a:fontRef idx="minor">
+            <a:schemeClr val="lt1"/>
+          </a:fontRef>
+        </p:style>
+        <p:txBody>
+          <a:bodyPr rtlCol="0" anchor="t"/>
+          <a:lstStyle/>
+          <a:p>
+            <a:pPr algn="ctr"/>
+            <a:r>
+              <a:rPr lang="en-US" sz="1200" dirty="0" err="1">
+                <a:solidFill>
+                  <a:schemeClr val="tx1"/>
+                </a:solidFill>
+                <a:latin typeface="Bahnschrift" panose="020B0502040204020203" pitchFamily="34" charset="0"/>
+              </a:rPr>
+              <a:t>GameManager</a:t>
+            </a:r>
+            <a:endParaRPr lang="en-US" sz="1200" dirty="0">
+              <a:solidFill>
+                <a:schemeClr val="tx1"/>
+              </a:solidFill>
+              <a:latin typeface="Bahnschrift" panose="020B0502040204020203" pitchFamily="34" charset="0"/>
+            </a:endParaRPr>
+          </a:p>
+        </p:txBody>
+      </p:sp>
+      <p:sp>
+        <p:nvSpPr>
+          <p:cNvPr id="5" name="Rectangle 4">
+            <a:extLst>
+              <a:ext uri="{FF2B5EF4-FFF2-40B4-BE49-F238E27FC236}">
+                <a16:creationId xmlns:a16="http://schemas.microsoft.com/office/drawing/2014/main" id="{8F1A4D8E-23B7-454A-AD4C-8026B1295E26}"/>
+              </a:ext>
+            </a:extLst>
+          </p:cNvPr>
+          <p:cNvSpPr/>
+          <p:nvPr/>
+        </p:nvSpPr>
+        <p:spPr>
+          <a:xfrm>
+            <a:off x="5459003" y="595035"/>
+            <a:ext cx="1481855" cy="718860"/>
+          </a:xfrm>
+          <a:prstGeom prst="rect">
+            <a:avLst/>
+          </a:prstGeom>
+          <a:solidFill>
+            <a:schemeClr val="bg1"/>
+          </a:solidFill>
+          <a:ln>
+            <a:solidFill>
+              <a:schemeClr val="tx1"/>
+            </a:solidFill>
+          </a:ln>
+        </p:spPr>
+        <p:style>
+          <a:lnRef idx="2">
+            <a:schemeClr val="accent1">
+              <a:shade val="50000"/>
+            </a:schemeClr>
+          </a:lnRef>
+          <a:fillRef idx="1">
+            <a:schemeClr val="accent1"/>
+          </a:fillRef>
+          <a:effectRef idx="0">
+            <a:schemeClr val="accent1"/>
+          </a:effectRef>
+          <a:fontRef idx="minor">
+            <a:schemeClr val="lt1"/>
+          </a:fontRef>
+        </p:style>
+        <p:txBody>
+          <a:bodyPr rtlCol="0" anchor="t"/>
+          <a:lstStyle/>
+          <a:p>
+            <a:pPr algn="ctr"/>
+            <a:r>
+              <a:rPr lang="en-US" sz="1200" dirty="0" err="1">
+                <a:solidFill>
+                  <a:schemeClr val="tx1"/>
+                </a:solidFill>
+                <a:latin typeface="Bahnschrift" panose="020B0502040204020203" pitchFamily="34" charset="0"/>
+              </a:rPr>
+              <a:t>UserInterface</a:t>
+            </a:r>
+            <a:endParaRPr lang="en-US" sz="1200" dirty="0">
+              <a:solidFill>
+                <a:schemeClr val="tx1"/>
+              </a:solidFill>
+              <a:latin typeface="Bahnschrift" panose="020B0502040204020203" pitchFamily="34" charset="0"/>
+            </a:endParaRPr>
+          </a:p>
+        </p:txBody>
+      </p:sp>
+      <p:sp>
+        <p:nvSpPr>
+          <p:cNvPr id="6" name="Rectangle 5">
+            <a:extLst>
+              <a:ext uri="{FF2B5EF4-FFF2-40B4-BE49-F238E27FC236}">
+                <a16:creationId xmlns:a16="http://schemas.microsoft.com/office/drawing/2014/main" id="{F60A7400-6839-4713-A010-CA5753168CEB}"/>
+              </a:ext>
+            </a:extLst>
+          </p:cNvPr>
+          <p:cNvSpPr/>
+          <p:nvPr/>
+        </p:nvSpPr>
+        <p:spPr>
+          <a:xfrm>
+            <a:off x="1239268" y="4687519"/>
+            <a:ext cx="1481855" cy="718860"/>
+          </a:xfrm>
+          <a:prstGeom prst="rect">
+            <a:avLst/>
+          </a:prstGeom>
+          <a:solidFill>
+            <a:schemeClr val="bg1"/>
+          </a:solidFill>
+          <a:ln>
+            <a:solidFill>
+              <a:schemeClr val="tx1"/>
+            </a:solidFill>
+          </a:ln>
+        </p:spPr>
+        <p:style>
+          <a:lnRef idx="2">
+            <a:schemeClr val="accent1">
+              <a:shade val="50000"/>
+            </a:schemeClr>
+          </a:lnRef>
+          <a:fillRef idx="1">
+            <a:schemeClr val="accent1"/>
+          </a:fillRef>
+          <a:effectRef idx="0">
+            <a:schemeClr val="accent1"/>
+          </a:effectRef>
+          <a:fontRef idx="minor">
+            <a:schemeClr val="lt1"/>
+          </a:fontRef>
+        </p:style>
+        <p:txBody>
+          <a:bodyPr rtlCol="0" anchor="t"/>
+          <a:lstStyle/>
+          <a:p>
+            <a:pPr algn="ctr"/>
+            <a:r>
+              <a:rPr lang="en-US" sz="1200" dirty="0" err="1">
+                <a:solidFill>
+                  <a:schemeClr val="tx1"/>
+                </a:solidFill>
+                <a:latin typeface="Bahnschrift" panose="020B0502040204020203" pitchFamily="34" charset="0"/>
+              </a:rPr>
+              <a:t>CurrentBlock</a:t>
+            </a:r>
+            <a:endParaRPr lang="en-US" sz="1200" dirty="0">
+              <a:solidFill>
+                <a:schemeClr val="tx1"/>
+              </a:solidFill>
+              <a:latin typeface="Bahnschrift" panose="020B0502040204020203" pitchFamily="34" charset="0"/>
+            </a:endParaRPr>
+          </a:p>
+        </p:txBody>
+      </p:sp>
+      <p:sp>
+        <p:nvSpPr>
+          <p:cNvPr id="7" name="Rectangle 6">
+            <a:extLst>
+              <a:ext uri="{FF2B5EF4-FFF2-40B4-BE49-F238E27FC236}">
+                <a16:creationId xmlns:a16="http://schemas.microsoft.com/office/drawing/2014/main" id="{8480E956-7BA9-4A70-AA19-107A652C9ADB}"/>
+              </a:ext>
+            </a:extLst>
+          </p:cNvPr>
+          <p:cNvSpPr/>
+          <p:nvPr/>
+        </p:nvSpPr>
+        <p:spPr>
+          <a:xfrm>
+            <a:off x="3590370" y="4687519"/>
+            <a:ext cx="1481855" cy="718860"/>
+          </a:xfrm>
+          <a:prstGeom prst="rect">
+            <a:avLst/>
+          </a:prstGeom>
+          <a:solidFill>
+            <a:schemeClr val="bg1"/>
+          </a:solidFill>
+          <a:ln>
+            <a:solidFill>
+              <a:schemeClr val="tx1"/>
+            </a:solidFill>
+          </a:ln>
+        </p:spPr>
+        <p:style>
+          <a:lnRef idx="2">
+            <a:schemeClr val="accent1">
+              <a:shade val="50000"/>
+            </a:schemeClr>
+          </a:lnRef>
+          <a:fillRef idx="1">
+            <a:schemeClr val="accent1"/>
+          </a:fillRef>
+          <a:effectRef idx="0">
+            <a:schemeClr val="accent1"/>
+          </a:effectRef>
+          <a:fontRef idx="minor">
+            <a:schemeClr val="lt1"/>
+          </a:fontRef>
+        </p:style>
+        <p:txBody>
+          <a:bodyPr rtlCol="0" anchor="t"/>
+          <a:lstStyle/>
+          <a:p>
+            <a:pPr algn="ctr"/>
+            <a:r>
+              <a:rPr lang="en-US" sz="1200" dirty="0" err="1">
+                <a:solidFill>
+                  <a:schemeClr val="tx1"/>
+                </a:solidFill>
+                <a:latin typeface="Bahnschrift" panose="020B0502040204020203" pitchFamily="34" charset="0"/>
+              </a:rPr>
+              <a:t>StaticBlocks</a:t>
+            </a:r>
+            <a:endParaRPr lang="en-US" sz="1200" dirty="0">
+              <a:solidFill>
+                <a:schemeClr val="tx1"/>
+              </a:solidFill>
+              <a:latin typeface="Bahnschrift" panose="020B0502040204020203" pitchFamily="34" charset="0"/>
+            </a:endParaRPr>
+          </a:p>
+        </p:txBody>
+      </p:sp>
+      <p:sp>
+        <p:nvSpPr>
+          <p:cNvPr id="8" name="Rectangle 7">
+            <a:extLst>
+              <a:ext uri="{FF2B5EF4-FFF2-40B4-BE49-F238E27FC236}">
+                <a16:creationId xmlns:a16="http://schemas.microsoft.com/office/drawing/2014/main" id="{C6E77B5E-94BD-4711-89DB-10BBC7514B2F}"/>
+              </a:ext>
+            </a:extLst>
+          </p:cNvPr>
+          <p:cNvSpPr/>
+          <p:nvPr/>
+        </p:nvSpPr>
+        <p:spPr>
+          <a:xfrm>
+            <a:off x="5459003" y="4687519"/>
+            <a:ext cx="1481855" cy="718860"/>
+          </a:xfrm>
+          <a:prstGeom prst="rect">
+            <a:avLst/>
+          </a:prstGeom>
+          <a:solidFill>
+            <a:schemeClr val="bg1"/>
+          </a:solidFill>
+          <a:ln>
+            <a:solidFill>
+              <a:schemeClr val="tx1"/>
+            </a:solidFill>
+          </a:ln>
+        </p:spPr>
+        <p:style>
+          <a:lnRef idx="2">
+            <a:schemeClr val="accent1">
+              <a:shade val="50000"/>
+            </a:schemeClr>
+          </a:lnRef>
+          <a:fillRef idx="1">
+            <a:schemeClr val="accent1"/>
+          </a:fillRef>
+          <a:effectRef idx="0">
+            <a:schemeClr val="accent1"/>
+          </a:effectRef>
+          <a:fontRef idx="minor">
+            <a:schemeClr val="lt1"/>
+          </a:fontRef>
+        </p:style>
+        <p:txBody>
+          <a:bodyPr rtlCol="0" anchor="t"/>
+          <a:lstStyle/>
+          <a:p>
+            <a:pPr algn="ctr"/>
+            <a:r>
+              <a:rPr lang="en-US" sz="1200" dirty="0">
+                <a:solidFill>
+                  <a:schemeClr val="tx1"/>
+                </a:solidFill>
+                <a:latin typeface="Bahnschrift" panose="020B0502040204020203" pitchFamily="34" charset="0"/>
+              </a:rPr>
+              <a:t>Canvas</a:t>
+            </a:r>
+          </a:p>
+        </p:txBody>
+      </p:sp>
+      <p:sp>
+        <p:nvSpPr>
+          <p:cNvPr id="9" name="Rectangle 8">
+            <a:extLst>
+              <a:ext uri="{FF2B5EF4-FFF2-40B4-BE49-F238E27FC236}">
+                <a16:creationId xmlns:a16="http://schemas.microsoft.com/office/drawing/2014/main" id="{C8B08FDA-A2AE-4B85-B522-C45A844E8EFD}"/>
+              </a:ext>
+            </a:extLst>
+          </p:cNvPr>
+          <p:cNvSpPr/>
+          <p:nvPr/>
+        </p:nvSpPr>
+        <p:spPr>
+          <a:xfrm>
+            <a:off x="6772183" y="1999186"/>
+            <a:ext cx="1481855" cy="718860"/>
+          </a:xfrm>
+          <a:prstGeom prst="rect">
+            <a:avLst/>
+          </a:prstGeom>
+          <a:solidFill>
+            <a:schemeClr val="bg1"/>
+          </a:solidFill>
+          <a:ln>
+            <a:solidFill>
+              <a:schemeClr val="tx1"/>
+            </a:solidFill>
+          </a:ln>
+        </p:spPr>
+        <p:style>
+          <a:lnRef idx="2">
+            <a:schemeClr val="accent1">
+              <a:shade val="50000"/>
+            </a:schemeClr>
+          </a:lnRef>
+          <a:fillRef idx="1">
+            <a:schemeClr val="accent1"/>
+          </a:fillRef>
+          <a:effectRef idx="0">
+            <a:schemeClr val="accent1"/>
+          </a:effectRef>
+          <a:fontRef idx="minor">
+            <a:schemeClr val="lt1"/>
+          </a:fontRef>
+        </p:style>
+        <p:txBody>
+          <a:bodyPr rtlCol="0" anchor="t"/>
+          <a:lstStyle/>
+          <a:p>
+            <a:pPr algn="ctr"/>
+            <a:r>
+              <a:rPr lang="en-US" sz="1200" dirty="0" err="1">
+                <a:solidFill>
+                  <a:schemeClr val="tx1"/>
+                </a:solidFill>
+                <a:latin typeface="Bahnschrift" panose="020B0502040204020203" pitchFamily="34" charset="0"/>
+              </a:rPr>
+              <a:t>GameMenu</a:t>
+            </a:r>
+            <a:endParaRPr lang="en-US" sz="1200" dirty="0">
+              <a:solidFill>
+                <a:schemeClr val="tx1"/>
+              </a:solidFill>
+              <a:latin typeface="Bahnschrift" panose="020B0502040204020203" pitchFamily="34" charset="0"/>
+            </a:endParaRPr>
+          </a:p>
+        </p:txBody>
+      </p:sp>
+      <p:sp>
+        <p:nvSpPr>
+          <p:cNvPr id="10" name="Rectangle 9">
+            <a:extLst>
+              <a:ext uri="{FF2B5EF4-FFF2-40B4-BE49-F238E27FC236}">
+                <a16:creationId xmlns:a16="http://schemas.microsoft.com/office/drawing/2014/main" id="{6FBA20FB-D413-49D6-B8BC-8CC7F291D58C}"/>
+              </a:ext>
+            </a:extLst>
+          </p:cNvPr>
+          <p:cNvSpPr/>
+          <p:nvPr/>
+        </p:nvSpPr>
+        <p:spPr>
+          <a:xfrm>
+            <a:off x="3693110" y="1715101"/>
+            <a:ext cx="1481855" cy="718860"/>
+          </a:xfrm>
+          <a:prstGeom prst="rect">
+            <a:avLst/>
+          </a:prstGeom>
+          <a:solidFill>
+            <a:schemeClr val="bg1"/>
+          </a:solidFill>
+          <a:ln>
+            <a:solidFill>
+              <a:schemeClr val="tx1"/>
+            </a:solidFill>
+          </a:ln>
+        </p:spPr>
+        <p:style>
+          <a:lnRef idx="2">
+            <a:schemeClr val="accent1">
+              <a:shade val="50000"/>
+            </a:schemeClr>
+          </a:lnRef>
+          <a:fillRef idx="1">
+            <a:schemeClr val="accent1"/>
+          </a:fillRef>
+          <a:effectRef idx="0">
+            <a:schemeClr val="accent1"/>
+          </a:effectRef>
+          <a:fontRef idx="minor">
+            <a:schemeClr val="lt1"/>
+          </a:fontRef>
+        </p:style>
+        <p:txBody>
+          <a:bodyPr rtlCol="0" anchor="t"/>
+          <a:lstStyle/>
+          <a:p>
+            <a:pPr algn="ctr"/>
+            <a:r>
+              <a:rPr lang="en-US" sz="1200" dirty="0" err="1">
+                <a:solidFill>
+                  <a:schemeClr val="tx1"/>
+                </a:solidFill>
+                <a:latin typeface="Bahnschrift" panose="020B0502040204020203" pitchFamily="34" charset="0"/>
+              </a:rPr>
+              <a:t>GamePanel</a:t>
+            </a:r>
+            <a:endParaRPr lang="en-US" sz="1200" dirty="0">
+              <a:solidFill>
+                <a:schemeClr val="tx1"/>
+              </a:solidFill>
+              <a:latin typeface="Bahnschrift" panose="020B0502040204020203" pitchFamily="34" charset="0"/>
+            </a:endParaRPr>
+          </a:p>
+        </p:txBody>
+      </p:sp>
+      <p:sp>
+        <p:nvSpPr>
+          <p:cNvPr id="11" name="Rectangle 10">
+            <a:extLst>
+              <a:ext uri="{FF2B5EF4-FFF2-40B4-BE49-F238E27FC236}">
+                <a16:creationId xmlns:a16="http://schemas.microsoft.com/office/drawing/2014/main" id="{30B0CB7D-D42F-46F0-9304-F8BE9E6E6D52}"/>
+              </a:ext>
+            </a:extLst>
+          </p:cNvPr>
+          <p:cNvSpPr/>
+          <p:nvPr/>
+        </p:nvSpPr>
+        <p:spPr>
+          <a:xfrm>
+            <a:off x="8345010" y="3429000"/>
+            <a:ext cx="1481855" cy="718860"/>
+          </a:xfrm>
+          <a:prstGeom prst="rect">
+            <a:avLst/>
+          </a:prstGeom>
+          <a:solidFill>
+            <a:schemeClr val="bg1"/>
+          </a:solidFill>
+          <a:ln>
+            <a:solidFill>
+              <a:schemeClr val="tx1"/>
+            </a:solidFill>
+          </a:ln>
+        </p:spPr>
+        <p:style>
+          <a:lnRef idx="2">
+            <a:schemeClr val="accent1">
+              <a:shade val="50000"/>
+            </a:schemeClr>
+          </a:lnRef>
+          <a:fillRef idx="1">
+            <a:schemeClr val="accent1"/>
+          </a:fillRef>
+          <a:effectRef idx="0">
+            <a:schemeClr val="accent1"/>
+          </a:effectRef>
+          <a:fontRef idx="minor">
+            <a:schemeClr val="lt1"/>
+          </a:fontRef>
+        </p:style>
+        <p:txBody>
+          <a:bodyPr rtlCol="0" anchor="t"/>
+          <a:lstStyle/>
+          <a:p>
+            <a:pPr algn="ctr"/>
+            <a:r>
+              <a:rPr lang="en-US" sz="1200" dirty="0" err="1">
+                <a:solidFill>
+                  <a:schemeClr val="tx1"/>
+                </a:solidFill>
+                <a:latin typeface="Bahnschrift" panose="020B0502040204020203" pitchFamily="34" charset="0"/>
+              </a:rPr>
+              <a:t>GameSave</a:t>
+            </a:r>
+            <a:endParaRPr lang="en-US" sz="1200" dirty="0">
+              <a:solidFill>
+                <a:schemeClr val="tx1"/>
+              </a:solidFill>
+              <a:latin typeface="Bahnschrift" panose="020B0502040204020203" pitchFamily="34" charset="0"/>
+            </a:endParaRPr>
+          </a:p>
+        </p:txBody>
+      </p:sp>
+      <p:sp>
+        <p:nvSpPr>
+          <p:cNvPr id="12" name="Rectangle 11">
+            <a:extLst>
+              <a:ext uri="{FF2B5EF4-FFF2-40B4-BE49-F238E27FC236}">
+                <a16:creationId xmlns:a16="http://schemas.microsoft.com/office/drawing/2014/main" id="{68256523-81EB-4D46-97F1-99B9B8277A0E}"/>
+              </a:ext>
+            </a:extLst>
+          </p:cNvPr>
+          <p:cNvSpPr/>
+          <p:nvPr/>
+        </p:nvSpPr>
+        <p:spPr>
+          <a:xfrm>
+            <a:off x="2871722" y="2101861"/>
+            <a:ext cx="678782" cy="383343"/>
+          </a:xfrm>
+          <a:prstGeom prst="rect">
+            <a:avLst/>
+          </a:prstGeom>
+          <a:solidFill>
+            <a:schemeClr val="bg2"/>
+          </a:solidFill>
+          <a:ln>
+            <a:solidFill>
+              <a:schemeClr val="tx1"/>
+            </a:solidFill>
+          </a:ln>
+        </p:spPr>
+        <p:style>
+          <a:lnRef idx="2">
+            <a:schemeClr val="accent1">
+              <a:shade val="50000"/>
+            </a:schemeClr>
+          </a:lnRef>
+          <a:fillRef idx="1">
+            <a:schemeClr val="accent1"/>
+          </a:fillRef>
+          <a:effectRef idx="0">
+            <a:schemeClr val="accent1"/>
+          </a:effectRef>
+          <a:fontRef idx="minor">
+            <a:schemeClr val="lt1"/>
+          </a:fontRef>
+        </p:style>
+        <p:txBody>
+          <a:bodyPr rtlCol="0" anchor="t"/>
+          <a:lstStyle/>
+          <a:p>
+            <a:r>
+              <a:rPr lang="en-US" sz="800" dirty="0" err="1">
+                <a:solidFill>
+                  <a:schemeClr val="tx1"/>
+                </a:solidFill>
+                <a:latin typeface="Bahnschrift" panose="020B0502040204020203" pitchFamily="34" charset="0"/>
+              </a:rPr>
+              <a:t>manageUserInputs</a:t>
+            </a:r>
+            <a:endParaRPr lang="en-US" sz="800" dirty="0">
+              <a:solidFill>
+                <a:schemeClr val="tx1"/>
+              </a:solidFill>
+              <a:latin typeface="Bahnschrift" panose="020B0502040204020203" pitchFamily="34" charset="0"/>
+            </a:endParaRPr>
+          </a:p>
+        </p:txBody>
+      </p:sp>
+      <p:sp>
+        <p:nvSpPr>
+          <p:cNvPr id="13" name="Rectangle 12">
+            <a:extLst>
+              <a:ext uri="{FF2B5EF4-FFF2-40B4-BE49-F238E27FC236}">
+                <a16:creationId xmlns:a16="http://schemas.microsoft.com/office/drawing/2014/main" id="{9AC49071-03F5-4B20-9D88-23F77D52F89C}"/>
+              </a:ext>
+            </a:extLst>
+          </p:cNvPr>
+          <p:cNvSpPr/>
+          <p:nvPr/>
+        </p:nvSpPr>
+        <p:spPr>
+          <a:xfrm>
+            <a:off x="6132255" y="4953123"/>
+            <a:ext cx="678782" cy="383343"/>
+          </a:xfrm>
+          <a:prstGeom prst="rect">
+            <a:avLst/>
+          </a:prstGeom>
+          <a:solidFill>
+            <a:schemeClr val="bg2"/>
+          </a:solidFill>
+          <a:ln>
+            <a:solidFill>
+              <a:schemeClr val="tx1"/>
+            </a:solidFill>
+          </a:ln>
+        </p:spPr>
+        <p:style>
+          <a:lnRef idx="2">
+            <a:schemeClr val="accent1">
+              <a:shade val="50000"/>
+            </a:schemeClr>
+          </a:lnRef>
+          <a:fillRef idx="1">
+            <a:schemeClr val="accent1"/>
+          </a:fillRef>
+          <a:effectRef idx="0">
+            <a:schemeClr val="accent1"/>
+          </a:effectRef>
+          <a:fontRef idx="minor">
+            <a:schemeClr val="lt1"/>
+          </a:fontRef>
+        </p:style>
+        <p:txBody>
+          <a:bodyPr rtlCol="0" anchor="t"/>
+          <a:lstStyle/>
+          <a:p>
+            <a:r>
+              <a:rPr lang="en-US" sz="800" dirty="0" err="1">
+                <a:solidFill>
+                  <a:schemeClr val="tx1"/>
+                </a:solidFill>
+                <a:latin typeface="Bahnschrift" panose="020B0502040204020203" pitchFamily="34" charset="0"/>
+              </a:rPr>
+              <a:t>drawGameCanvas</a:t>
+            </a:r>
+            <a:endParaRPr lang="en-US" sz="800" dirty="0">
+              <a:solidFill>
+                <a:schemeClr val="tx1"/>
+              </a:solidFill>
+              <a:latin typeface="Bahnschrift" panose="020B0502040204020203" pitchFamily="34" charset="0"/>
+            </a:endParaRPr>
+          </a:p>
+        </p:txBody>
+      </p:sp>
+      <p:sp>
+        <p:nvSpPr>
+          <p:cNvPr id="14" name="Rectangle 13">
+            <a:extLst>
+              <a:ext uri="{FF2B5EF4-FFF2-40B4-BE49-F238E27FC236}">
+                <a16:creationId xmlns:a16="http://schemas.microsoft.com/office/drawing/2014/main" id="{4C5D53E0-9F8B-489F-996A-D75D28A8B36E}"/>
+              </a:ext>
+            </a:extLst>
+          </p:cNvPr>
+          <p:cNvSpPr/>
+          <p:nvPr/>
+        </p:nvSpPr>
+        <p:spPr>
+          <a:xfrm>
+            <a:off x="649343" y="5637313"/>
+            <a:ext cx="678781" cy="383343"/>
+          </a:xfrm>
+          <a:prstGeom prst="rect">
+            <a:avLst/>
+          </a:prstGeom>
+          <a:solidFill>
+            <a:schemeClr val="bg2"/>
+          </a:solidFill>
+          <a:ln>
+            <a:solidFill>
+              <a:schemeClr val="tx1"/>
+            </a:solidFill>
+          </a:ln>
+        </p:spPr>
+        <p:style>
+          <a:lnRef idx="2">
+            <a:schemeClr val="accent1">
+              <a:shade val="50000"/>
+            </a:schemeClr>
+          </a:lnRef>
+          <a:fillRef idx="1">
+            <a:schemeClr val="accent1"/>
+          </a:fillRef>
+          <a:effectRef idx="0">
+            <a:schemeClr val="accent1"/>
+          </a:effectRef>
+          <a:fontRef idx="minor">
+            <a:schemeClr val="lt1"/>
+          </a:fontRef>
+        </p:style>
+        <p:txBody>
+          <a:bodyPr rtlCol="0" anchor="t"/>
+          <a:lstStyle/>
+          <a:p>
+            <a:r>
+              <a:rPr lang="en-US" sz="800" dirty="0" err="1">
+                <a:solidFill>
+                  <a:schemeClr val="tx1"/>
+                </a:solidFill>
+                <a:latin typeface="Bahnschrift" panose="020B0502040204020203" pitchFamily="34" charset="0"/>
+              </a:rPr>
+              <a:t>detectContact</a:t>
+            </a:r>
+            <a:endParaRPr lang="en-US" sz="800" dirty="0">
+              <a:solidFill>
+                <a:schemeClr val="tx1"/>
+              </a:solidFill>
+              <a:latin typeface="Bahnschrift" panose="020B0502040204020203" pitchFamily="34" charset="0"/>
+            </a:endParaRPr>
+          </a:p>
+        </p:txBody>
+      </p:sp>
+      <p:sp>
+        <p:nvSpPr>
+          <p:cNvPr id="15" name="Rectangle 14">
+            <a:extLst>
+              <a:ext uri="{FF2B5EF4-FFF2-40B4-BE49-F238E27FC236}">
+                <a16:creationId xmlns:a16="http://schemas.microsoft.com/office/drawing/2014/main" id="{FA92C4AB-DE73-45F9-9E97-0B07D36557A9}"/>
+              </a:ext>
+            </a:extLst>
+          </p:cNvPr>
+          <p:cNvSpPr/>
+          <p:nvPr/>
+        </p:nvSpPr>
+        <p:spPr>
+          <a:xfrm>
+            <a:off x="1471962" y="3561872"/>
+            <a:ext cx="678782" cy="383343"/>
+          </a:xfrm>
+          <a:prstGeom prst="rect">
+            <a:avLst/>
+          </a:prstGeom>
+          <a:solidFill>
+            <a:schemeClr val="bg2"/>
+          </a:solidFill>
+          <a:ln>
+            <a:solidFill>
+              <a:schemeClr val="tx1"/>
+            </a:solidFill>
+          </a:ln>
+        </p:spPr>
+        <p:style>
+          <a:lnRef idx="2">
+            <a:schemeClr val="accent1">
+              <a:shade val="50000"/>
+            </a:schemeClr>
+          </a:lnRef>
+          <a:fillRef idx="1">
+            <a:schemeClr val="accent1"/>
+          </a:fillRef>
+          <a:effectRef idx="0">
+            <a:schemeClr val="accent1"/>
+          </a:effectRef>
+          <a:fontRef idx="minor">
+            <a:schemeClr val="lt1"/>
+          </a:fontRef>
+        </p:style>
+        <p:txBody>
+          <a:bodyPr rtlCol="0" anchor="t"/>
+          <a:lstStyle/>
+          <a:p>
+            <a:r>
+              <a:rPr lang="en-US" sz="800" dirty="0" err="1">
+                <a:solidFill>
+                  <a:schemeClr val="tx1"/>
+                </a:solidFill>
+                <a:latin typeface="Bahnschrift" panose="020B0502040204020203" pitchFamily="34" charset="0"/>
+              </a:rPr>
+              <a:t>generateNextBlock</a:t>
+            </a:r>
+            <a:endParaRPr lang="en-US" sz="800" dirty="0">
+              <a:solidFill>
+                <a:schemeClr val="tx1"/>
+              </a:solidFill>
+              <a:latin typeface="Bahnschrift" panose="020B0502040204020203" pitchFamily="34" charset="0"/>
+            </a:endParaRPr>
+          </a:p>
+        </p:txBody>
+      </p:sp>
+      <p:sp>
+        <p:nvSpPr>
+          <p:cNvPr id="16" name="Rectangle 15">
+            <a:extLst>
+              <a:ext uri="{FF2B5EF4-FFF2-40B4-BE49-F238E27FC236}">
+                <a16:creationId xmlns:a16="http://schemas.microsoft.com/office/drawing/2014/main" id="{1248B575-533D-497B-9384-380108191BBB}"/>
+              </a:ext>
+            </a:extLst>
+          </p:cNvPr>
+          <p:cNvSpPr/>
+          <p:nvPr/>
+        </p:nvSpPr>
+        <p:spPr>
+          <a:xfrm>
+            <a:off x="2875985" y="1585053"/>
+            <a:ext cx="678782" cy="383343"/>
+          </a:xfrm>
+          <a:prstGeom prst="rect">
+            <a:avLst/>
+          </a:prstGeom>
+          <a:solidFill>
+            <a:schemeClr val="bg2"/>
+          </a:solidFill>
+          <a:ln>
+            <a:solidFill>
+              <a:schemeClr val="tx1"/>
+            </a:solidFill>
+          </a:ln>
+        </p:spPr>
+        <p:style>
+          <a:lnRef idx="2">
+            <a:schemeClr val="accent1">
+              <a:shade val="50000"/>
+            </a:schemeClr>
+          </a:lnRef>
+          <a:fillRef idx="1">
+            <a:schemeClr val="accent1"/>
+          </a:fillRef>
+          <a:effectRef idx="0">
+            <a:schemeClr val="accent1"/>
+          </a:effectRef>
+          <a:fontRef idx="minor">
+            <a:schemeClr val="lt1"/>
+          </a:fontRef>
+        </p:style>
+        <p:txBody>
+          <a:bodyPr rtlCol="0" anchor="t"/>
+          <a:lstStyle/>
+          <a:p>
+            <a:r>
+              <a:rPr lang="en-US" sz="800" dirty="0">
+                <a:solidFill>
+                  <a:schemeClr val="tx1"/>
+                </a:solidFill>
+                <a:latin typeface="Bahnschrift" panose="020B0502040204020203" pitchFamily="34" charset="0"/>
+              </a:rPr>
+              <a:t>Display</a:t>
+            </a:r>
+          </a:p>
+        </p:txBody>
+      </p:sp>
+      <p:sp>
+        <p:nvSpPr>
+          <p:cNvPr id="17" name="Rectangle 16">
+            <a:extLst>
+              <a:ext uri="{FF2B5EF4-FFF2-40B4-BE49-F238E27FC236}">
+                <a16:creationId xmlns:a16="http://schemas.microsoft.com/office/drawing/2014/main" id="{0A3F6743-4C00-40A3-8E04-14AD7412DBD2}"/>
+              </a:ext>
+            </a:extLst>
+          </p:cNvPr>
+          <p:cNvSpPr/>
+          <p:nvPr/>
+        </p:nvSpPr>
+        <p:spPr>
+          <a:xfrm>
+            <a:off x="2135059" y="1847234"/>
+            <a:ext cx="678782" cy="383343"/>
+          </a:xfrm>
+          <a:prstGeom prst="rect">
+            <a:avLst/>
+          </a:prstGeom>
+          <a:solidFill>
+            <a:schemeClr val="bg2"/>
+          </a:solidFill>
+          <a:ln>
+            <a:solidFill>
+              <a:schemeClr val="tx1"/>
+            </a:solidFill>
+          </a:ln>
+        </p:spPr>
+        <p:style>
+          <a:lnRef idx="2">
+            <a:schemeClr val="accent1">
+              <a:shade val="50000"/>
+            </a:schemeClr>
+          </a:lnRef>
+          <a:fillRef idx="1">
+            <a:schemeClr val="accent1"/>
+          </a:fillRef>
+          <a:effectRef idx="0">
+            <a:schemeClr val="accent1"/>
+          </a:effectRef>
+          <a:fontRef idx="minor">
+            <a:schemeClr val="lt1"/>
+          </a:fontRef>
+        </p:style>
+        <p:txBody>
+          <a:bodyPr rtlCol="0" anchor="t"/>
+          <a:lstStyle/>
+          <a:p>
+            <a:r>
+              <a:rPr lang="en-US" sz="800" dirty="0" err="1">
+                <a:solidFill>
+                  <a:schemeClr val="tx1"/>
+                </a:solidFill>
+                <a:latin typeface="Bahnschrift" panose="020B0502040204020203" pitchFamily="34" charset="0"/>
+              </a:rPr>
+              <a:t>generateFeedback</a:t>
+            </a:r>
+            <a:endParaRPr lang="en-US" sz="800" dirty="0">
+              <a:solidFill>
+                <a:schemeClr val="tx1"/>
+              </a:solidFill>
+              <a:latin typeface="Bahnschrift" panose="020B0502040204020203" pitchFamily="34" charset="0"/>
+            </a:endParaRPr>
+          </a:p>
+        </p:txBody>
+      </p:sp>
+      <p:sp>
+        <p:nvSpPr>
+          <p:cNvPr id="18" name="Rectangle 17">
+            <a:extLst>
+              <a:ext uri="{FF2B5EF4-FFF2-40B4-BE49-F238E27FC236}">
+                <a16:creationId xmlns:a16="http://schemas.microsoft.com/office/drawing/2014/main" id="{CACD0559-0BE6-4013-A8DB-2C28A64BDA91}"/>
+              </a:ext>
+            </a:extLst>
+          </p:cNvPr>
+          <p:cNvSpPr/>
+          <p:nvPr/>
+        </p:nvSpPr>
+        <p:spPr>
+          <a:xfrm>
+            <a:off x="9914542" y="3788430"/>
+            <a:ext cx="678781" cy="383343"/>
+          </a:xfrm>
+          <a:prstGeom prst="rect">
+            <a:avLst/>
+          </a:prstGeom>
+          <a:solidFill>
+            <a:schemeClr val="bg2"/>
+          </a:solidFill>
+          <a:ln>
+            <a:solidFill>
+              <a:schemeClr val="tx1"/>
+            </a:solidFill>
+          </a:ln>
+        </p:spPr>
+        <p:style>
+          <a:lnRef idx="2">
+            <a:schemeClr val="accent1">
+              <a:shade val="50000"/>
+            </a:schemeClr>
+          </a:lnRef>
+          <a:fillRef idx="1">
+            <a:schemeClr val="accent1"/>
+          </a:fillRef>
+          <a:effectRef idx="0">
+            <a:schemeClr val="accent1"/>
+          </a:effectRef>
+          <a:fontRef idx="minor">
+            <a:schemeClr val="lt1"/>
+          </a:fontRef>
+        </p:style>
+        <p:txBody>
+          <a:bodyPr rtlCol="0" anchor="t"/>
+          <a:lstStyle/>
+          <a:p>
+            <a:r>
+              <a:rPr lang="en-US" sz="800" dirty="0" err="1">
+                <a:solidFill>
+                  <a:schemeClr val="tx1"/>
+                </a:solidFill>
+                <a:latin typeface="Bahnschrift" panose="020B0502040204020203" pitchFamily="34" charset="0"/>
+              </a:rPr>
+              <a:t>saveScore</a:t>
+            </a:r>
+            <a:endParaRPr lang="en-US" sz="800" dirty="0">
+              <a:solidFill>
+                <a:schemeClr val="tx1"/>
+              </a:solidFill>
+              <a:latin typeface="Bahnschrift" panose="020B0502040204020203" pitchFamily="34" charset="0"/>
+            </a:endParaRPr>
+          </a:p>
+        </p:txBody>
+      </p:sp>
+      <p:sp>
+        <p:nvSpPr>
+          <p:cNvPr id="19" name="Rectangle 18">
+            <a:extLst>
+              <a:ext uri="{FF2B5EF4-FFF2-40B4-BE49-F238E27FC236}">
+                <a16:creationId xmlns:a16="http://schemas.microsoft.com/office/drawing/2014/main" id="{37B2F9A9-4EA8-4C16-B5ED-5B26B352B76D}"/>
+              </a:ext>
+            </a:extLst>
+          </p:cNvPr>
+          <p:cNvSpPr/>
+          <p:nvPr/>
+        </p:nvSpPr>
+        <p:spPr>
+          <a:xfrm>
+            <a:off x="3606653" y="5626832"/>
+            <a:ext cx="678782" cy="383343"/>
+          </a:xfrm>
+          <a:prstGeom prst="rect">
+            <a:avLst/>
+          </a:prstGeom>
+          <a:solidFill>
+            <a:schemeClr val="bg2"/>
+          </a:solidFill>
+          <a:ln>
+            <a:solidFill>
+              <a:schemeClr val="tx1"/>
+            </a:solidFill>
+          </a:ln>
+        </p:spPr>
+        <p:style>
+          <a:lnRef idx="2">
+            <a:schemeClr val="accent1">
+              <a:shade val="50000"/>
+            </a:schemeClr>
+          </a:lnRef>
+          <a:fillRef idx="1">
+            <a:schemeClr val="accent1"/>
+          </a:fillRef>
+          <a:effectRef idx="0">
+            <a:schemeClr val="accent1"/>
+          </a:effectRef>
+          <a:fontRef idx="minor">
+            <a:schemeClr val="lt1"/>
+          </a:fontRef>
+        </p:style>
+        <p:txBody>
+          <a:bodyPr rtlCol="0" anchor="t"/>
+          <a:lstStyle/>
+          <a:p>
+            <a:r>
+              <a:rPr lang="en-US" sz="800" dirty="0" err="1">
+                <a:solidFill>
+                  <a:schemeClr val="tx1"/>
+                </a:solidFill>
+                <a:latin typeface="Bahnschrift" panose="020B0502040204020203" pitchFamily="34" charset="0"/>
+              </a:rPr>
+              <a:t>computeStaticBlockPosition</a:t>
+            </a:r>
+            <a:endParaRPr lang="en-US" sz="800" dirty="0">
+              <a:solidFill>
+                <a:schemeClr val="tx1"/>
+              </a:solidFill>
+              <a:latin typeface="Bahnschrift" panose="020B0502040204020203" pitchFamily="34" charset="0"/>
+            </a:endParaRPr>
+          </a:p>
+        </p:txBody>
+      </p:sp>
+      <p:sp>
+        <p:nvSpPr>
+          <p:cNvPr id="20" name="Rectangle 19">
+            <a:extLst>
+              <a:ext uri="{FF2B5EF4-FFF2-40B4-BE49-F238E27FC236}">
+                <a16:creationId xmlns:a16="http://schemas.microsoft.com/office/drawing/2014/main" id="{E73D799A-3690-4C5A-B5A5-C039992D39EE}"/>
+              </a:ext>
+            </a:extLst>
+          </p:cNvPr>
+          <p:cNvSpPr/>
+          <p:nvPr/>
+        </p:nvSpPr>
+        <p:spPr>
+          <a:xfrm>
+            <a:off x="1493051" y="5637313"/>
+            <a:ext cx="678782" cy="383343"/>
+          </a:xfrm>
+          <a:prstGeom prst="rect">
+            <a:avLst/>
+          </a:prstGeom>
+          <a:solidFill>
+            <a:schemeClr val="bg2"/>
+          </a:solidFill>
+          <a:ln>
+            <a:solidFill>
+              <a:schemeClr val="tx1"/>
+            </a:solidFill>
+          </a:ln>
+        </p:spPr>
+        <p:style>
+          <a:lnRef idx="2">
+            <a:schemeClr val="accent1">
+              <a:shade val="50000"/>
+            </a:schemeClr>
+          </a:lnRef>
+          <a:fillRef idx="1">
+            <a:schemeClr val="accent1"/>
+          </a:fillRef>
+          <a:effectRef idx="0">
+            <a:schemeClr val="accent1"/>
+          </a:effectRef>
+          <a:fontRef idx="minor">
+            <a:schemeClr val="lt1"/>
+          </a:fontRef>
+        </p:style>
+        <p:txBody>
+          <a:bodyPr rtlCol="0" anchor="t"/>
+          <a:lstStyle/>
+          <a:p>
+            <a:r>
+              <a:rPr lang="en-US" sz="800" dirty="0" err="1">
+                <a:solidFill>
+                  <a:schemeClr val="tx1"/>
+                </a:solidFill>
+                <a:latin typeface="Bahnschrift" panose="020B0502040204020203" pitchFamily="34" charset="0"/>
+              </a:rPr>
+              <a:t>computeCurrentBlockPosition</a:t>
+            </a:r>
+            <a:endParaRPr lang="en-US" sz="800" dirty="0">
+              <a:solidFill>
+                <a:schemeClr val="tx1"/>
+              </a:solidFill>
+              <a:latin typeface="Bahnschrift" panose="020B0502040204020203" pitchFamily="34" charset="0"/>
+            </a:endParaRPr>
+          </a:p>
+        </p:txBody>
+      </p:sp>
+      <p:sp>
+        <p:nvSpPr>
+          <p:cNvPr id="21" name="Rectangle 20">
+            <a:extLst>
+              <a:ext uri="{FF2B5EF4-FFF2-40B4-BE49-F238E27FC236}">
+                <a16:creationId xmlns:a16="http://schemas.microsoft.com/office/drawing/2014/main" id="{D865D770-0E90-4515-B230-A63CCD4091CB}"/>
+              </a:ext>
+            </a:extLst>
+          </p:cNvPr>
+          <p:cNvSpPr/>
+          <p:nvPr/>
+        </p:nvSpPr>
+        <p:spPr>
+          <a:xfrm>
+            <a:off x="1471962" y="3125522"/>
+            <a:ext cx="678781" cy="383343"/>
+          </a:xfrm>
+          <a:prstGeom prst="rect">
+            <a:avLst/>
+          </a:prstGeom>
+          <a:solidFill>
+            <a:schemeClr val="bg2"/>
+          </a:solidFill>
+          <a:ln>
+            <a:solidFill>
+              <a:schemeClr val="tx1"/>
+            </a:solidFill>
+          </a:ln>
+        </p:spPr>
+        <p:style>
+          <a:lnRef idx="2">
+            <a:schemeClr val="accent1">
+              <a:shade val="50000"/>
+            </a:schemeClr>
+          </a:lnRef>
+          <a:fillRef idx="1">
+            <a:schemeClr val="accent1"/>
+          </a:fillRef>
+          <a:effectRef idx="0">
+            <a:schemeClr val="accent1"/>
+          </a:effectRef>
+          <a:fontRef idx="minor">
+            <a:schemeClr val="lt1"/>
+          </a:fontRef>
+        </p:style>
+        <p:txBody>
+          <a:bodyPr rtlCol="0" anchor="t"/>
+          <a:lstStyle/>
+          <a:p>
+            <a:r>
+              <a:rPr lang="en-US" sz="800" dirty="0" err="1">
+                <a:solidFill>
+                  <a:schemeClr val="tx1"/>
+                </a:solidFill>
+                <a:latin typeface="Bahnschrift" panose="020B0502040204020203" pitchFamily="34" charset="0"/>
+              </a:rPr>
+              <a:t>computeScore</a:t>
+            </a:r>
+            <a:endParaRPr lang="en-US" sz="800" dirty="0">
+              <a:solidFill>
+                <a:schemeClr val="tx1"/>
+              </a:solidFill>
+              <a:latin typeface="Bahnschrift" panose="020B0502040204020203" pitchFamily="34" charset="0"/>
+            </a:endParaRPr>
+          </a:p>
+        </p:txBody>
+      </p:sp>
+      <p:sp>
+        <p:nvSpPr>
+          <p:cNvPr id="22" name="Rectangle 21">
+            <a:extLst>
+              <a:ext uri="{FF2B5EF4-FFF2-40B4-BE49-F238E27FC236}">
+                <a16:creationId xmlns:a16="http://schemas.microsoft.com/office/drawing/2014/main" id="{7044EC37-4BDA-423D-A103-2CD8BA6F4BF6}"/>
+              </a:ext>
+            </a:extLst>
+          </p:cNvPr>
+          <p:cNvSpPr/>
+          <p:nvPr/>
+        </p:nvSpPr>
+        <p:spPr>
+          <a:xfrm>
+            <a:off x="4562412" y="853966"/>
+            <a:ext cx="678782" cy="383343"/>
+          </a:xfrm>
+          <a:prstGeom prst="rect">
+            <a:avLst/>
+          </a:prstGeom>
+          <a:solidFill>
+            <a:schemeClr val="bg2"/>
+          </a:solidFill>
+          <a:ln>
+            <a:solidFill>
+              <a:schemeClr val="tx1"/>
+            </a:solidFill>
+          </a:ln>
+        </p:spPr>
+        <p:style>
+          <a:lnRef idx="2">
+            <a:schemeClr val="accent1">
+              <a:shade val="50000"/>
+            </a:schemeClr>
+          </a:lnRef>
+          <a:fillRef idx="1">
+            <a:schemeClr val="accent1"/>
+          </a:fillRef>
+          <a:effectRef idx="0">
+            <a:schemeClr val="accent1"/>
+          </a:effectRef>
+          <a:fontRef idx="minor">
+            <a:schemeClr val="lt1"/>
+          </a:fontRef>
+        </p:style>
+        <p:txBody>
+          <a:bodyPr rtlCol="0" anchor="t"/>
+          <a:lstStyle/>
+          <a:p>
+            <a:r>
+              <a:rPr lang="en-US" sz="800" dirty="0">
+                <a:solidFill>
+                  <a:schemeClr val="tx1"/>
+                </a:solidFill>
+                <a:latin typeface="Bahnschrift" panose="020B0502040204020203" pitchFamily="34" charset="0"/>
+              </a:rPr>
+              <a:t>Display</a:t>
+            </a:r>
+          </a:p>
+        </p:txBody>
+      </p:sp>
+      <p:sp>
+        <p:nvSpPr>
+          <p:cNvPr id="23" name="Rectangle 22">
+            <a:extLst>
+              <a:ext uri="{FF2B5EF4-FFF2-40B4-BE49-F238E27FC236}">
+                <a16:creationId xmlns:a16="http://schemas.microsoft.com/office/drawing/2014/main" id="{58A06233-9CBE-4CF4-8C9C-C44CA42264B1}"/>
+              </a:ext>
+            </a:extLst>
+          </p:cNvPr>
+          <p:cNvSpPr/>
+          <p:nvPr/>
+        </p:nvSpPr>
+        <p:spPr>
+          <a:xfrm>
+            <a:off x="8361216" y="1834738"/>
+            <a:ext cx="678782" cy="383343"/>
+          </a:xfrm>
+          <a:prstGeom prst="rect">
+            <a:avLst/>
+          </a:prstGeom>
+          <a:solidFill>
+            <a:schemeClr val="bg2"/>
+          </a:solidFill>
+          <a:ln>
+            <a:solidFill>
+              <a:schemeClr val="tx1"/>
+            </a:solidFill>
+          </a:ln>
+        </p:spPr>
+        <p:style>
+          <a:lnRef idx="2">
+            <a:schemeClr val="accent1">
+              <a:shade val="50000"/>
+            </a:schemeClr>
+          </a:lnRef>
+          <a:fillRef idx="1">
+            <a:schemeClr val="accent1"/>
+          </a:fillRef>
+          <a:effectRef idx="0">
+            <a:schemeClr val="accent1"/>
+          </a:effectRef>
+          <a:fontRef idx="minor">
+            <a:schemeClr val="lt1"/>
+          </a:fontRef>
+        </p:style>
+        <p:txBody>
+          <a:bodyPr rtlCol="0" anchor="t"/>
+          <a:lstStyle/>
+          <a:p>
+            <a:r>
+              <a:rPr lang="en-US" sz="800" dirty="0">
+                <a:solidFill>
+                  <a:schemeClr val="tx1"/>
+                </a:solidFill>
+                <a:latin typeface="Bahnschrift" panose="020B0502040204020203" pitchFamily="34" charset="0"/>
+              </a:rPr>
+              <a:t>Display</a:t>
+            </a:r>
+          </a:p>
+        </p:txBody>
+      </p:sp>
+      <p:sp>
+        <p:nvSpPr>
+          <p:cNvPr id="25" name="Rectangle 24">
+            <a:extLst>
+              <a:ext uri="{FF2B5EF4-FFF2-40B4-BE49-F238E27FC236}">
+                <a16:creationId xmlns:a16="http://schemas.microsoft.com/office/drawing/2014/main" id="{78F79D33-0C42-4BE3-B6AE-49FF67481022}"/>
+              </a:ext>
+            </a:extLst>
+          </p:cNvPr>
+          <p:cNvSpPr/>
+          <p:nvPr/>
+        </p:nvSpPr>
+        <p:spPr>
+          <a:xfrm>
+            <a:off x="5702492" y="1228360"/>
+            <a:ext cx="159798" cy="133165"/>
+          </a:xfrm>
+          <a:prstGeom prst="rect">
+            <a:avLst/>
+          </a:prstGeom>
+          <a:noFill/>
+          <a:ln>
+            <a:noFill/>
+          </a:ln>
+        </p:spPr>
+        <p:style>
+          <a:lnRef idx="2">
+            <a:schemeClr val="accent1">
+              <a:shade val="50000"/>
+            </a:schemeClr>
+          </a:lnRef>
+          <a:fillRef idx="1">
+            <a:schemeClr val="accent1"/>
+          </a:fillRef>
+          <a:effectRef idx="0">
+            <a:schemeClr val="accent1"/>
+          </a:effectRef>
+          <a:fontRef idx="minor">
+            <a:schemeClr val="lt1"/>
+          </a:fontRef>
+        </p:style>
+        <p:txBody>
+          <a:bodyPr rtlCol="0" anchor="ctr"/>
+          <a:lstStyle/>
+          <a:p>
+            <a:pPr algn="ctr"/>
+            <a:endParaRPr lang="en-US"/>
+          </a:p>
+        </p:txBody>
+      </p:sp>
+      <p:sp>
+        <p:nvSpPr>
+          <p:cNvPr id="26" name="Rectangle 25">
+            <a:extLst>
+              <a:ext uri="{FF2B5EF4-FFF2-40B4-BE49-F238E27FC236}">
+                <a16:creationId xmlns:a16="http://schemas.microsoft.com/office/drawing/2014/main" id="{57AD79AE-C2DF-4A32-B02D-60EC392468B2}"/>
+              </a:ext>
+            </a:extLst>
+          </p:cNvPr>
+          <p:cNvSpPr/>
+          <p:nvPr/>
+        </p:nvSpPr>
+        <p:spPr>
+          <a:xfrm>
+            <a:off x="6481160" y="1228360"/>
+            <a:ext cx="159798" cy="133165"/>
+          </a:xfrm>
+          <a:prstGeom prst="rect">
+            <a:avLst/>
+          </a:prstGeom>
+          <a:noFill/>
+          <a:ln>
+            <a:noFill/>
+          </a:ln>
+        </p:spPr>
+        <p:style>
+          <a:lnRef idx="2">
+            <a:schemeClr val="accent1">
+              <a:shade val="50000"/>
+            </a:schemeClr>
+          </a:lnRef>
+          <a:fillRef idx="1">
+            <a:schemeClr val="accent1"/>
+          </a:fillRef>
+          <a:effectRef idx="0">
+            <a:schemeClr val="accent1"/>
+          </a:effectRef>
+          <a:fontRef idx="minor">
+            <a:schemeClr val="lt1"/>
+          </a:fontRef>
+        </p:style>
+        <p:txBody>
+          <a:bodyPr rtlCol="0" anchor="ctr"/>
+          <a:lstStyle/>
+          <a:p>
+            <a:pPr algn="ctr"/>
+            <a:endParaRPr lang="en-US"/>
+          </a:p>
+        </p:txBody>
+      </p:sp>
+      <p:cxnSp>
+        <p:nvCxnSpPr>
+          <p:cNvPr id="28" name="Connecteur : en angle 27">
+            <a:extLst>
+              <a:ext uri="{FF2B5EF4-FFF2-40B4-BE49-F238E27FC236}">
+                <a16:creationId xmlns:a16="http://schemas.microsoft.com/office/drawing/2014/main" id="{43A368A9-2BA1-48DB-A663-34E82D26E01B}"/>
+              </a:ext>
+            </a:extLst>
+          </p:cNvPr>
+          <p:cNvCxnSpPr>
+            <a:stCxn id="10" idx="0"/>
+            <a:endCxn id="25" idx="2"/>
+          </p:cNvCxnSpPr>
+          <p:nvPr/>
+        </p:nvCxnSpPr>
+        <p:spPr>
+          <a:xfrm rot="5400000" flipH="1" flipV="1">
+            <a:off x="4931426" y="864137"/>
+            <a:ext cx="353576" cy="1348353"/>
+          </a:xfrm>
+          <a:prstGeom prst="bentConnector3">
+            <a:avLst/>
+          </a:prstGeom>
+          <a:ln w="9525">
+            <a:tailEnd type="diamond" w="lg" len="lg"/>
+          </a:ln>
+        </p:spPr>
+        <p:style>
+          <a:lnRef idx="1">
+            <a:schemeClr val="dk1"/>
+          </a:lnRef>
+          <a:fillRef idx="0">
+            <a:schemeClr val="dk1"/>
+          </a:fillRef>
+          <a:effectRef idx="0">
+            <a:schemeClr val="dk1"/>
+          </a:effectRef>
+          <a:fontRef idx="minor">
+            <a:schemeClr val="tx1"/>
+          </a:fontRef>
+        </p:style>
+      </p:cxnSp>
+      <p:cxnSp>
+        <p:nvCxnSpPr>
+          <p:cNvPr id="29" name="Connecteur : en angle 28">
+            <a:extLst>
+              <a:ext uri="{FF2B5EF4-FFF2-40B4-BE49-F238E27FC236}">
+                <a16:creationId xmlns:a16="http://schemas.microsoft.com/office/drawing/2014/main" id="{6650BD60-18BF-40FC-BDE6-50355FC2C9DC}"/>
+              </a:ext>
+            </a:extLst>
+          </p:cNvPr>
+          <p:cNvCxnSpPr>
+            <a:cxnSpLocks/>
+            <a:stCxn id="9" idx="0"/>
+            <a:endCxn id="26" idx="2"/>
+          </p:cNvCxnSpPr>
+          <p:nvPr/>
+        </p:nvCxnSpPr>
+        <p:spPr>
+          <a:xfrm rot="16200000" flipV="1">
+            <a:off x="6718255" y="1204330"/>
+            <a:ext cx="637661" cy="952052"/>
+          </a:xfrm>
+          <a:prstGeom prst="bentConnector3">
+            <a:avLst>
+              <a:gd name="adj1" fmla="val 50000"/>
+            </a:avLst>
+          </a:prstGeom>
+          <a:ln w="9525">
+            <a:tailEnd type="diamond" w="lg" len="lg"/>
+          </a:ln>
+        </p:spPr>
+        <p:style>
+          <a:lnRef idx="1">
+            <a:schemeClr val="dk1"/>
+          </a:lnRef>
+          <a:fillRef idx="0">
+            <a:schemeClr val="dk1"/>
+          </a:fillRef>
+          <a:effectRef idx="0">
+            <a:schemeClr val="dk1"/>
+          </a:effectRef>
+          <a:fontRef idx="minor">
+            <a:schemeClr val="tx1"/>
+          </a:fontRef>
+        </p:style>
+      </p:cxnSp>
+      <p:cxnSp>
+        <p:nvCxnSpPr>
+          <p:cNvPr id="32" name="Connecteur : en angle 31">
+            <a:extLst>
+              <a:ext uri="{FF2B5EF4-FFF2-40B4-BE49-F238E27FC236}">
+                <a16:creationId xmlns:a16="http://schemas.microsoft.com/office/drawing/2014/main" id="{3859165F-59B7-4975-9707-20FCA70EECCE}"/>
+              </a:ext>
+            </a:extLst>
+          </p:cNvPr>
+          <p:cNvCxnSpPr>
+            <a:cxnSpLocks/>
+            <a:stCxn id="8" idx="0"/>
+            <a:endCxn id="49" idx="2"/>
+          </p:cNvCxnSpPr>
+          <p:nvPr/>
+        </p:nvCxnSpPr>
+        <p:spPr>
+          <a:xfrm rot="16200000" flipV="1">
+            <a:off x="4381620" y="2869207"/>
+            <a:ext cx="2244494" cy="1392129"/>
+          </a:xfrm>
+          <a:prstGeom prst="bentConnector3">
+            <a:avLst>
+              <a:gd name="adj1" fmla="val 50000"/>
+            </a:avLst>
+          </a:prstGeom>
+          <a:ln w="9525">
+            <a:tailEnd type="diamond" w="lg" len="lg"/>
+          </a:ln>
+        </p:spPr>
+        <p:style>
+          <a:lnRef idx="1">
+            <a:schemeClr val="dk1"/>
+          </a:lnRef>
+          <a:fillRef idx="0">
+            <a:schemeClr val="dk1"/>
+          </a:fillRef>
+          <a:effectRef idx="0">
+            <a:schemeClr val="dk1"/>
+          </a:effectRef>
+          <a:fontRef idx="minor">
+            <a:schemeClr val="tx1"/>
+          </a:fontRef>
+        </p:style>
+      </p:cxnSp>
+      <p:sp>
+        <p:nvSpPr>
+          <p:cNvPr id="35" name="Rectangle 34">
+            <a:extLst>
+              <a:ext uri="{FF2B5EF4-FFF2-40B4-BE49-F238E27FC236}">
+                <a16:creationId xmlns:a16="http://schemas.microsoft.com/office/drawing/2014/main" id="{266B9D7F-9CEE-45D1-80BC-D21E3222FFF7}"/>
+              </a:ext>
+            </a:extLst>
+          </p:cNvPr>
+          <p:cNvSpPr/>
+          <p:nvPr/>
+        </p:nvSpPr>
+        <p:spPr>
+          <a:xfrm>
+            <a:off x="2705580" y="4068812"/>
+            <a:ext cx="159798" cy="133165"/>
+          </a:xfrm>
+          <a:prstGeom prst="rect">
+            <a:avLst/>
+          </a:prstGeom>
+          <a:noFill/>
+          <a:ln>
+            <a:noFill/>
+          </a:ln>
+        </p:spPr>
+        <p:style>
+          <a:lnRef idx="2">
+            <a:schemeClr val="accent1">
+              <a:shade val="50000"/>
+            </a:schemeClr>
+          </a:lnRef>
+          <a:fillRef idx="1">
+            <a:schemeClr val="accent1"/>
+          </a:fillRef>
+          <a:effectRef idx="0">
+            <a:schemeClr val="accent1"/>
+          </a:effectRef>
+          <a:fontRef idx="minor">
+            <a:schemeClr val="lt1"/>
+          </a:fontRef>
+        </p:style>
+        <p:txBody>
+          <a:bodyPr rtlCol="0" anchor="ctr"/>
+          <a:lstStyle/>
+          <a:p>
+            <a:pPr algn="ctr"/>
+            <a:endParaRPr lang="en-US"/>
+          </a:p>
+        </p:txBody>
+      </p:sp>
+      <p:sp>
+        <p:nvSpPr>
+          <p:cNvPr id="36" name="Rectangle 35">
+            <a:extLst>
+              <a:ext uri="{FF2B5EF4-FFF2-40B4-BE49-F238E27FC236}">
+                <a16:creationId xmlns:a16="http://schemas.microsoft.com/office/drawing/2014/main" id="{D8FFD13A-C8E5-430E-965F-1ABAE409FE78}"/>
+              </a:ext>
+            </a:extLst>
+          </p:cNvPr>
+          <p:cNvSpPr/>
+          <p:nvPr/>
+        </p:nvSpPr>
+        <p:spPr>
+          <a:xfrm>
+            <a:off x="3484248" y="4068812"/>
+            <a:ext cx="159798" cy="133165"/>
+          </a:xfrm>
+          <a:prstGeom prst="rect">
+            <a:avLst/>
+          </a:prstGeom>
+          <a:noFill/>
+          <a:ln>
+            <a:noFill/>
+          </a:ln>
+        </p:spPr>
+        <p:style>
+          <a:lnRef idx="2">
+            <a:schemeClr val="accent1">
+              <a:shade val="50000"/>
+            </a:schemeClr>
+          </a:lnRef>
+          <a:fillRef idx="1">
+            <a:schemeClr val="accent1"/>
+          </a:fillRef>
+          <a:effectRef idx="0">
+            <a:schemeClr val="accent1"/>
+          </a:effectRef>
+          <a:fontRef idx="minor">
+            <a:schemeClr val="lt1"/>
+          </a:fontRef>
+        </p:style>
+        <p:txBody>
+          <a:bodyPr rtlCol="0" anchor="ctr"/>
+          <a:lstStyle/>
+          <a:p>
+            <a:pPr algn="ctr"/>
+            <a:endParaRPr lang="en-US"/>
+          </a:p>
+        </p:txBody>
+      </p:sp>
+      <p:cxnSp>
+        <p:nvCxnSpPr>
+          <p:cNvPr id="37" name="Connecteur : en angle 36">
+            <a:extLst>
+              <a:ext uri="{FF2B5EF4-FFF2-40B4-BE49-F238E27FC236}">
+                <a16:creationId xmlns:a16="http://schemas.microsoft.com/office/drawing/2014/main" id="{BC4E61A0-19BB-45A2-BC2E-8EC652347A2D}"/>
+              </a:ext>
+            </a:extLst>
+          </p:cNvPr>
+          <p:cNvCxnSpPr>
+            <a:cxnSpLocks/>
+            <a:stCxn id="6" idx="0"/>
+            <a:endCxn id="35" idx="2"/>
+          </p:cNvCxnSpPr>
+          <p:nvPr/>
+        </p:nvCxnSpPr>
+        <p:spPr>
+          <a:xfrm rot="5400000" flipH="1" flipV="1">
+            <a:off x="2140066" y="4042107"/>
+            <a:ext cx="485542" cy="805283"/>
+          </a:xfrm>
+          <a:prstGeom prst="bentConnector3">
+            <a:avLst>
+              <a:gd name="adj1" fmla="val 50000"/>
+            </a:avLst>
+          </a:prstGeom>
+          <a:ln w="9525">
+            <a:tailEnd type="diamond" w="lg" len="lg"/>
+          </a:ln>
+        </p:spPr>
+        <p:style>
+          <a:lnRef idx="1">
+            <a:schemeClr val="dk1"/>
+          </a:lnRef>
+          <a:fillRef idx="0">
+            <a:schemeClr val="dk1"/>
+          </a:fillRef>
+          <a:effectRef idx="0">
+            <a:schemeClr val="dk1"/>
+          </a:effectRef>
+          <a:fontRef idx="minor">
+            <a:schemeClr val="tx1"/>
+          </a:fontRef>
+        </p:style>
+      </p:cxnSp>
+      <p:cxnSp>
+        <p:nvCxnSpPr>
+          <p:cNvPr id="40" name="Connecteur : en angle 39">
+            <a:extLst>
+              <a:ext uri="{FF2B5EF4-FFF2-40B4-BE49-F238E27FC236}">
+                <a16:creationId xmlns:a16="http://schemas.microsoft.com/office/drawing/2014/main" id="{C415CD8A-644E-4705-9146-DD430071EBFE}"/>
+              </a:ext>
+            </a:extLst>
+          </p:cNvPr>
+          <p:cNvCxnSpPr>
+            <a:cxnSpLocks/>
+            <a:stCxn id="7" idx="0"/>
+            <a:endCxn id="36" idx="2"/>
+          </p:cNvCxnSpPr>
+          <p:nvPr/>
+        </p:nvCxnSpPr>
+        <p:spPr>
+          <a:xfrm rot="16200000" flipV="1">
+            <a:off x="3704952" y="4061172"/>
+            <a:ext cx="485542" cy="767151"/>
+          </a:xfrm>
+          <a:prstGeom prst="bentConnector3">
+            <a:avLst>
+              <a:gd name="adj1" fmla="val 50000"/>
+            </a:avLst>
+          </a:prstGeom>
+          <a:ln w="9525">
+            <a:tailEnd type="diamond" w="lg" len="lg"/>
+          </a:ln>
+        </p:spPr>
+        <p:style>
+          <a:lnRef idx="1">
+            <a:schemeClr val="dk1"/>
+          </a:lnRef>
+          <a:fillRef idx="0">
+            <a:schemeClr val="dk1"/>
+          </a:fillRef>
+          <a:effectRef idx="0">
+            <a:schemeClr val="dk1"/>
+          </a:effectRef>
+          <a:fontRef idx="minor">
+            <a:schemeClr val="tx1"/>
+          </a:fontRef>
+        </p:style>
+      </p:cxnSp>
+      <p:cxnSp>
+        <p:nvCxnSpPr>
+          <p:cNvPr id="43" name="Connecteur : en angle 42">
+            <a:extLst>
+              <a:ext uri="{FF2B5EF4-FFF2-40B4-BE49-F238E27FC236}">
+                <a16:creationId xmlns:a16="http://schemas.microsoft.com/office/drawing/2014/main" id="{AD8C7F80-BC3C-4A66-8AED-384D1BCF030A}"/>
+              </a:ext>
+            </a:extLst>
+          </p:cNvPr>
+          <p:cNvCxnSpPr>
+            <a:cxnSpLocks/>
+            <a:stCxn id="11" idx="0"/>
+            <a:endCxn id="9" idx="2"/>
+          </p:cNvCxnSpPr>
+          <p:nvPr/>
+        </p:nvCxnSpPr>
+        <p:spPr>
+          <a:xfrm rot="16200000" flipV="1">
+            <a:off x="7944048" y="2287109"/>
+            <a:ext cx="710954" cy="1572827"/>
+          </a:xfrm>
+          <a:prstGeom prst="bentConnector3">
+            <a:avLst>
+              <a:gd name="adj1" fmla="val 50000"/>
+            </a:avLst>
+          </a:prstGeom>
+          <a:ln w="9525">
+            <a:tailEnd type="diamond" w="lg" len="lg"/>
+          </a:ln>
+        </p:spPr>
+        <p:style>
+          <a:lnRef idx="1">
+            <a:schemeClr val="dk1"/>
+          </a:lnRef>
+          <a:fillRef idx="0">
+            <a:schemeClr val="dk1"/>
+          </a:fillRef>
+          <a:effectRef idx="0">
+            <a:schemeClr val="dk1"/>
+          </a:effectRef>
+          <a:fontRef idx="minor">
+            <a:schemeClr val="tx1"/>
+          </a:fontRef>
+        </p:style>
+      </p:cxnSp>
+      <p:cxnSp>
+        <p:nvCxnSpPr>
+          <p:cNvPr id="46" name="Connecteur : en angle 45">
+            <a:extLst>
+              <a:ext uri="{FF2B5EF4-FFF2-40B4-BE49-F238E27FC236}">
+                <a16:creationId xmlns:a16="http://schemas.microsoft.com/office/drawing/2014/main" id="{BEA9B168-EF4F-418C-8944-5DC2EE809AFE}"/>
+              </a:ext>
+            </a:extLst>
+          </p:cNvPr>
+          <p:cNvCxnSpPr>
+            <a:cxnSpLocks/>
+            <a:stCxn id="24" idx="0"/>
+            <a:endCxn id="48" idx="2"/>
+          </p:cNvCxnSpPr>
+          <p:nvPr/>
+        </p:nvCxnSpPr>
+        <p:spPr>
+          <a:xfrm rot="5400000" flipH="1" flipV="1">
+            <a:off x="3262659" y="2359047"/>
+            <a:ext cx="682497" cy="850454"/>
+          </a:xfrm>
+          <a:prstGeom prst="bentConnector3">
+            <a:avLst>
+              <a:gd name="adj1" fmla="val 50000"/>
+            </a:avLst>
+          </a:prstGeom>
+          <a:ln w="9525">
+            <a:tailEnd type="diamond" w="lg" len="lg"/>
+          </a:ln>
+        </p:spPr>
+        <p:style>
+          <a:lnRef idx="1">
+            <a:schemeClr val="dk1"/>
+          </a:lnRef>
+          <a:fillRef idx="0">
+            <a:schemeClr val="dk1"/>
+          </a:fillRef>
+          <a:effectRef idx="0">
+            <a:schemeClr val="dk1"/>
+          </a:effectRef>
+          <a:fontRef idx="minor">
+            <a:schemeClr val="tx1"/>
+          </a:fontRef>
+        </p:style>
+      </p:cxnSp>
+      <p:sp>
+        <p:nvSpPr>
+          <p:cNvPr id="48" name="Rectangle 47">
+            <a:extLst>
+              <a:ext uri="{FF2B5EF4-FFF2-40B4-BE49-F238E27FC236}">
+                <a16:creationId xmlns:a16="http://schemas.microsoft.com/office/drawing/2014/main" id="{4295F73F-4A4C-4735-AAE4-8D5562222C59}"/>
+              </a:ext>
+            </a:extLst>
+          </p:cNvPr>
+          <p:cNvSpPr/>
+          <p:nvPr/>
+        </p:nvSpPr>
+        <p:spPr>
+          <a:xfrm>
+            <a:off x="3949235" y="2309860"/>
+            <a:ext cx="159798" cy="133165"/>
+          </a:xfrm>
+          <a:prstGeom prst="rect">
+            <a:avLst/>
+          </a:prstGeom>
+          <a:noFill/>
+          <a:ln>
+            <a:noFill/>
+          </a:ln>
+        </p:spPr>
+        <p:style>
+          <a:lnRef idx="2">
+            <a:schemeClr val="accent1">
+              <a:shade val="50000"/>
+            </a:schemeClr>
+          </a:lnRef>
+          <a:fillRef idx="1">
+            <a:schemeClr val="accent1"/>
+          </a:fillRef>
+          <a:effectRef idx="0">
+            <a:schemeClr val="accent1"/>
+          </a:effectRef>
+          <a:fontRef idx="minor">
+            <a:schemeClr val="lt1"/>
+          </a:fontRef>
+        </p:style>
+        <p:txBody>
+          <a:bodyPr rtlCol="0" anchor="ctr"/>
+          <a:lstStyle/>
+          <a:p>
+            <a:pPr algn="ctr"/>
+            <a:endParaRPr lang="en-US"/>
+          </a:p>
+        </p:txBody>
+      </p:sp>
+      <p:sp>
+        <p:nvSpPr>
+          <p:cNvPr id="49" name="Rectangle 48">
+            <a:extLst>
+              <a:ext uri="{FF2B5EF4-FFF2-40B4-BE49-F238E27FC236}">
+                <a16:creationId xmlns:a16="http://schemas.microsoft.com/office/drawing/2014/main" id="{6BDA3CDD-C347-4DCA-B125-12BC805969B2}"/>
+              </a:ext>
+            </a:extLst>
+          </p:cNvPr>
+          <p:cNvSpPr/>
+          <p:nvPr/>
+        </p:nvSpPr>
+        <p:spPr>
+          <a:xfrm>
+            <a:off x="4727903" y="2309860"/>
+            <a:ext cx="159798" cy="133165"/>
+          </a:xfrm>
+          <a:prstGeom prst="rect">
+            <a:avLst/>
+          </a:prstGeom>
+          <a:noFill/>
+          <a:ln>
+            <a:noFill/>
+          </a:ln>
+        </p:spPr>
+        <p:style>
+          <a:lnRef idx="2">
+            <a:schemeClr val="accent1">
+              <a:shade val="50000"/>
+            </a:schemeClr>
+          </a:lnRef>
+          <a:fillRef idx="1">
+            <a:schemeClr val="accent1"/>
+          </a:fillRef>
+          <a:effectRef idx="0">
+            <a:schemeClr val="accent1"/>
+          </a:effectRef>
+          <a:fontRef idx="minor">
+            <a:schemeClr val="lt1"/>
+          </a:fontRef>
+        </p:style>
+        <p:txBody>
+          <a:bodyPr rtlCol="0" anchor="ctr"/>
+          <a:lstStyle/>
+          <a:p>
+            <a:pPr algn="ctr"/>
+            <a:endParaRPr lang="en-US"/>
+          </a:p>
+        </p:txBody>
+      </p:sp>
+      <p:sp>
+        <p:nvSpPr>
+          <p:cNvPr id="55" name="Rectangle 54">
+            <a:extLst>
+              <a:ext uri="{FF2B5EF4-FFF2-40B4-BE49-F238E27FC236}">
+                <a16:creationId xmlns:a16="http://schemas.microsoft.com/office/drawing/2014/main" id="{6F037836-6AEC-460D-B8A5-6CE773A5CEA5}"/>
+              </a:ext>
+            </a:extLst>
+          </p:cNvPr>
+          <p:cNvSpPr/>
+          <p:nvPr/>
+        </p:nvSpPr>
+        <p:spPr>
+          <a:xfrm>
+            <a:off x="5496086" y="816235"/>
+            <a:ext cx="1222213" cy="383343"/>
+          </a:xfrm>
+          <a:prstGeom prst="rect">
+            <a:avLst/>
+          </a:prstGeom>
+          <a:noFill/>
+          <a:ln>
+            <a:noFill/>
+          </a:ln>
+        </p:spPr>
+        <p:style>
+          <a:lnRef idx="2">
+            <a:schemeClr val="accent1">
+              <a:shade val="50000"/>
+            </a:schemeClr>
+          </a:lnRef>
+          <a:fillRef idx="1">
+            <a:schemeClr val="accent1"/>
+          </a:fillRef>
+          <a:effectRef idx="0">
+            <a:schemeClr val="accent1"/>
+          </a:effectRef>
+          <a:fontRef idx="minor">
+            <a:schemeClr val="lt1"/>
+          </a:fontRef>
+        </p:style>
+        <p:txBody>
+          <a:bodyPr rtlCol="0" anchor="t"/>
+          <a:lstStyle/>
+          <a:p>
+            <a:r>
+              <a:rPr lang="en-US" sz="800" dirty="0" err="1">
+                <a:solidFill>
+                  <a:schemeClr val="tx1"/>
+                </a:solidFill>
+                <a:latin typeface="Bahnschrift" panose="020B0502040204020203" pitchFamily="34" charset="0"/>
+              </a:rPr>
+              <a:t>DisplayGameMenu</a:t>
+            </a:r>
+            <a:r>
+              <a:rPr lang="en-US" sz="800" dirty="0">
+                <a:solidFill>
+                  <a:schemeClr val="tx1"/>
+                </a:solidFill>
+                <a:latin typeface="Bahnschrift" panose="020B0502040204020203" pitchFamily="34" charset="0"/>
+              </a:rPr>
+              <a:t>()</a:t>
+            </a:r>
+          </a:p>
+          <a:p>
+            <a:r>
+              <a:rPr lang="en-US" sz="800" dirty="0" err="1">
+                <a:solidFill>
+                  <a:schemeClr val="tx1"/>
+                </a:solidFill>
+                <a:latin typeface="Bahnschrift" panose="020B0502040204020203" pitchFamily="34" charset="0"/>
+              </a:rPr>
+              <a:t>DisplayGamePanel</a:t>
+            </a:r>
+            <a:r>
+              <a:rPr lang="en-US" sz="800" dirty="0">
+                <a:solidFill>
+                  <a:schemeClr val="tx1"/>
+                </a:solidFill>
+                <a:latin typeface="Bahnschrift" panose="020B0502040204020203" pitchFamily="34" charset="0"/>
+              </a:rPr>
+              <a:t>()</a:t>
+            </a:r>
+          </a:p>
+        </p:txBody>
+      </p:sp>
+      <p:sp>
+        <p:nvSpPr>
+          <p:cNvPr id="56" name="Rectangle 55">
+            <a:extLst>
+              <a:ext uri="{FF2B5EF4-FFF2-40B4-BE49-F238E27FC236}">
+                <a16:creationId xmlns:a16="http://schemas.microsoft.com/office/drawing/2014/main" id="{39514B45-B665-4879-9A30-A47A2795B325}"/>
+              </a:ext>
+            </a:extLst>
+          </p:cNvPr>
+          <p:cNvSpPr/>
+          <p:nvPr/>
+        </p:nvSpPr>
+        <p:spPr>
+          <a:xfrm>
+            <a:off x="3690606" y="1922485"/>
+            <a:ext cx="1222213" cy="383343"/>
+          </a:xfrm>
+          <a:prstGeom prst="rect">
+            <a:avLst/>
+          </a:prstGeom>
+          <a:noFill/>
+          <a:ln>
+            <a:noFill/>
+          </a:ln>
+        </p:spPr>
+        <p:style>
+          <a:lnRef idx="2">
+            <a:schemeClr val="accent1">
+              <a:shade val="50000"/>
+            </a:schemeClr>
+          </a:lnRef>
+          <a:fillRef idx="1">
+            <a:schemeClr val="accent1"/>
+          </a:fillRef>
+          <a:effectRef idx="0">
+            <a:schemeClr val="accent1"/>
+          </a:effectRef>
+          <a:fontRef idx="minor">
+            <a:schemeClr val="lt1"/>
+          </a:fontRef>
+        </p:style>
+        <p:txBody>
+          <a:bodyPr rtlCol="0" anchor="t"/>
+          <a:lstStyle/>
+          <a:p>
+            <a:r>
+              <a:rPr lang="en-US" sz="800" dirty="0" err="1">
+                <a:solidFill>
+                  <a:schemeClr val="tx1"/>
+                </a:solidFill>
+                <a:latin typeface="Bahnschrift" panose="020B0502040204020203" pitchFamily="34" charset="0"/>
+              </a:rPr>
+              <a:t>handleKeyEvent</a:t>
+            </a:r>
+            <a:r>
+              <a:rPr lang="en-US" sz="800" dirty="0">
+                <a:solidFill>
+                  <a:schemeClr val="tx1"/>
+                </a:solidFill>
+                <a:latin typeface="Bahnschrift" panose="020B0502040204020203" pitchFamily="34" charset="0"/>
+              </a:rPr>
+              <a:t>()</a:t>
+            </a:r>
+          </a:p>
+          <a:p>
+            <a:r>
+              <a:rPr lang="en-US" sz="800" dirty="0" err="1">
+                <a:solidFill>
+                  <a:schemeClr val="tx1"/>
+                </a:solidFill>
+                <a:latin typeface="Bahnschrift" panose="020B0502040204020203" pitchFamily="34" charset="0"/>
+              </a:rPr>
+              <a:t>goToNextTick</a:t>
+            </a:r>
+            <a:r>
+              <a:rPr lang="en-US" sz="800" dirty="0">
+                <a:solidFill>
+                  <a:schemeClr val="tx1"/>
+                </a:solidFill>
+                <a:latin typeface="Bahnschrift" panose="020B0502040204020203" pitchFamily="34" charset="0"/>
+              </a:rPr>
+              <a:t>()</a:t>
+            </a:r>
+          </a:p>
+          <a:p>
+            <a:r>
+              <a:rPr lang="en-US" sz="800" dirty="0">
+                <a:solidFill>
+                  <a:schemeClr val="tx1"/>
+                </a:solidFill>
+                <a:latin typeface="Bahnschrift" panose="020B0502040204020203" pitchFamily="34" charset="0"/>
+              </a:rPr>
+              <a:t>exit()</a:t>
+            </a:r>
+          </a:p>
+        </p:txBody>
+      </p:sp>
+      <p:sp>
+        <p:nvSpPr>
+          <p:cNvPr id="57" name="Rectangle 56">
+            <a:extLst>
+              <a:ext uri="{FF2B5EF4-FFF2-40B4-BE49-F238E27FC236}">
+                <a16:creationId xmlns:a16="http://schemas.microsoft.com/office/drawing/2014/main" id="{477C6DF1-07B4-4A52-A211-ACDB27F2ECE7}"/>
+              </a:ext>
+            </a:extLst>
+          </p:cNvPr>
+          <p:cNvSpPr/>
+          <p:nvPr/>
+        </p:nvSpPr>
+        <p:spPr>
+          <a:xfrm>
+            <a:off x="6771931" y="2220368"/>
+            <a:ext cx="1222213" cy="383343"/>
+          </a:xfrm>
+          <a:prstGeom prst="rect">
+            <a:avLst/>
+          </a:prstGeom>
+          <a:noFill/>
+          <a:ln>
+            <a:noFill/>
+          </a:ln>
+        </p:spPr>
+        <p:style>
+          <a:lnRef idx="2">
+            <a:schemeClr val="accent1">
+              <a:shade val="50000"/>
+            </a:schemeClr>
+          </a:lnRef>
+          <a:fillRef idx="1">
+            <a:schemeClr val="accent1"/>
+          </a:fillRef>
+          <a:effectRef idx="0">
+            <a:schemeClr val="accent1"/>
+          </a:effectRef>
+          <a:fontRef idx="minor">
+            <a:schemeClr val="lt1"/>
+          </a:fontRef>
+        </p:style>
+        <p:txBody>
+          <a:bodyPr rtlCol="0" anchor="t"/>
+          <a:lstStyle/>
+          <a:p>
+            <a:r>
+              <a:rPr lang="en-US" sz="800" dirty="0" err="1">
+                <a:solidFill>
+                  <a:schemeClr val="tx1"/>
+                </a:solidFill>
+                <a:latin typeface="Bahnschrift" panose="020B0502040204020203" pitchFamily="34" charset="0"/>
+              </a:rPr>
+              <a:t>StartGame</a:t>
+            </a:r>
+            <a:r>
+              <a:rPr lang="en-US" sz="800" dirty="0">
+                <a:solidFill>
+                  <a:schemeClr val="tx1"/>
+                </a:solidFill>
+                <a:latin typeface="Bahnschrift" panose="020B0502040204020203" pitchFamily="34" charset="0"/>
+              </a:rPr>
+              <a:t>()</a:t>
+            </a:r>
+          </a:p>
+          <a:p>
+            <a:r>
+              <a:rPr lang="en-US" sz="800" dirty="0" err="1">
+                <a:solidFill>
+                  <a:schemeClr val="tx1"/>
+                </a:solidFill>
+                <a:latin typeface="Bahnschrift" panose="020B0502040204020203" pitchFamily="34" charset="0"/>
+              </a:rPr>
+              <a:t>SaveScore</a:t>
+            </a:r>
+            <a:r>
+              <a:rPr lang="en-US" sz="800" dirty="0">
+                <a:solidFill>
+                  <a:schemeClr val="tx1"/>
+                </a:solidFill>
+                <a:latin typeface="Bahnschrift" panose="020B0502040204020203" pitchFamily="34" charset="0"/>
+              </a:rPr>
+              <a:t>()</a:t>
+            </a:r>
+          </a:p>
+          <a:p>
+            <a:r>
+              <a:rPr lang="en-US" sz="800" dirty="0" err="1">
+                <a:solidFill>
+                  <a:schemeClr val="tx1"/>
+                </a:solidFill>
+                <a:latin typeface="Bahnschrift" panose="020B0502040204020203" pitchFamily="34" charset="0"/>
+              </a:rPr>
+              <a:t>DisplayScoreBoard</a:t>
+            </a:r>
+            <a:r>
+              <a:rPr lang="en-US" sz="800" dirty="0">
+                <a:solidFill>
+                  <a:schemeClr val="tx1"/>
+                </a:solidFill>
+                <a:latin typeface="Bahnschrift" panose="020B0502040204020203" pitchFamily="34" charset="0"/>
+              </a:rPr>
+              <a:t>()</a:t>
+            </a:r>
+          </a:p>
+        </p:txBody>
+      </p:sp>
+      <p:sp>
+        <p:nvSpPr>
+          <p:cNvPr id="58" name="Rectangle 57">
+            <a:extLst>
+              <a:ext uri="{FF2B5EF4-FFF2-40B4-BE49-F238E27FC236}">
+                <a16:creationId xmlns:a16="http://schemas.microsoft.com/office/drawing/2014/main" id="{8DD7B7B8-3130-4D12-9571-474C77CB887B}"/>
+              </a:ext>
+            </a:extLst>
+          </p:cNvPr>
+          <p:cNvSpPr/>
+          <p:nvPr/>
+        </p:nvSpPr>
+        <p:spPr>
+          <a:xfrm>
+            <a:off x="5459003" y="4871005"/>
+            <a:ext cx="1222213" cy="383343"/>
+          </a:xfrm>
+          <a:prstGeom prst="rect">
+            <a:avLst/>
+          </a:prstGeom>
+          <a:noFill/>
+          <a:ln>
+            <a:noFill/>
+          </a:ln>
+        </p:spPr>
+        <p:style>
+          <a:lnRef idx="2">
+            <a:schemeClr val="accent1">
+              <a:shade val="50000"/>
+            </a:schemeClr>
+          </a:lnRef>
+          <a:fillRef idx="1">
+            <a:schemeClr val="accent1"/>
+          </a:fillRef>
+          <a:effectRef idx="0">
+            <a:schemeClr val="accent1"/>
+          </a:effectRef>
+          <a:fontRef idx="minor">
+            <a:schemeClr val="lt1"/>
+          </a:fontRef>
+        </p:style>
+        <p:txBody>
+          <a:bodyPr rtlCol="0" anchor="t"/>
+          <a:lstStyle/>
+          <a:p>
+            <a:r>
+              <a:rPr lang="en-US" sz="800" dirty="0">
+                <a:solidFill>
+                  <a:schemeClr val="tx1"/>
+                </a:solidFill>
+                <a:latin typeface="Bahnschrift" panose="020B0502040204020203" pitchFamily="34" charset="0"/>
+              </a:rPr>
+              <a:t>reset()</a:t>
+            </a:r>
+          </a:p>
+          <a:p>
+            <a:r>
+              <a:rPr lang="en-US" sz="800" dirty="0" err="1">
+                <a:solidFill>
+                  <a:schemeClr val="tx1"/>
+                </a:solidFill>
+                <a:latin typeface="Bahnschrift" panose="020B0502040204020203" pitchFamily="34" charset="0"/>
+              </a:rPr>
+              <a:t>deleteRow</a:t>
+            </a:r>
+            <a:r>
+              <a:rPr lang="en-US" sz="800" dirty="0">
+                <a:solidFill>
+                  <a:schemeClr val="tx1"/>
+                </a:solidFill>
+                <a:latin typeface="Bahnschrift" panose="020B0502040204020203" pitchFamily="34" charset="0"/>
+              </a:rPr>
+              <a:t>()</a:t>
+            </a:r>
+          </a:p>
+          <a:p>
+            <a:r>
+              <a:rPr lang="en-US" sz="800" dirty="0">
+                <a:solidFill>
+                  <a:schemeClr val="tx1"/>
+                </a:solidFill>
+                <a:latin typeface="Bahnschrift" panose="020B0502040204020203" pitchFamily="34" charset="0"/>
+              </a:rPr>
+              <a:t>draw()</a:t>
+            </a:r>
+          </a:p>
+        </p:txBody>
+      </p:sp>
+      <p:sp>
+        <p:nvSpPr>
+          <p:cNvPr id="70" name="Rectangle 69">
+            <a:extLst>
+              <a:ext uri="{FF2B5EF4-FFF2-40B4-BE49-F238E27FC236}">
+                <a16:creationId xmlns:a16="http://schemas.microsoft.com/office/drawing/2014/main" id="{B889DAC8-9CA4-478E-929A-9A8FA78B2C14}"/>
+              </a:ext>
+            </a:extLst>
+          </p:cNvPr>
+          <p:cNvSpPr/>
+          <p:nvPr/>
+        </p:nvSpPr>
+        <p:spPr>
+          <a:xfrm>
+            <a:off x="2437751" y="3346768"/>
+            <a:ext cx="1403997" cy="721643"/>
+          </a:xfrm>
+          <a:prstGeom prst="rect">
+            <a:avLst/>
+          </a:prstGeom>
+          <a:noFill/>
+          <a:ln>
+            <a:noFill/>
+          </a:ln>
+        </p:spPr>
+        <p:style>
+          <a:lnRef idx="2">
+            <a:schemeClr val="accent1">
+              <a:shade val="50000"/>
+            </a:schemeClr>
+          </a:lnRef>
+          <a:fillRef idx="1">
+            <a:schemeClr val="accent1"/>
+          </a:fillRef>
+          <a:effectRef idx="0">
+            <a:schemeClr val="accent1"/>
+          </a:effectRef>
+          <a:fontRef idx="minor">
+            <a:schemeClr val="lt1"/>
+          </a:fontRef>
+        </p:style>
+        <p:txBody>
+          <a:bodyPr rtlCol="0" anchor="t"/>
+          <a:lstStyle/>
+          <a:p>
+            <a:r>
+              <a:rPr lang="en-US" sz="800" dirty="0" err="1">
+                <a:solidFill>
+                  <a:schemeClr val="tx1"/>
+                </a:solidFill>
+                <a:latin typeface="Bahnschrift" panose="020B0502040204020203" pitchFamily="34" charset="0"/>
+              </a:rPr>
+              <a:t>rotateBlock</a:t>
+            </a:r>
+            <a:r>
+              <a:rPr lang="en-US" sz="800" dirty="0">
+                <a:solidFill>
+                  <a:schemeClr val="tx1"/>
+                </a:solidFill>
+                <a:latin typeface="Bahnschrift" panose="020B0502040204020203" pitchFamily="34" charset="0"/>
+              </a:rPr>
+              <a:t>()</a:t>
+            </a:r>
+          </a:p>
+          <a:p>
+            <a:r>
+              <a:rPr lang="en-US" sz="800" dirty="0" err="1">
+                <a:solidFill>
+                  <a:schemeClr val="tx1"/>
+                </a:solidFill>
+                <a:latin typeface="Bahnschrift" panose="020B0502040204020203" pitchFamily="34" charset="0"/>
+              </a:rPr>
+              <a:t>moveBlockFast</a:t>
+            </a:r>
+            <a:r>
+              <a:rPr lang="en-US" sz="800" dirty="0">
+                <a:solidFill>
+                  <a:schemeClr val="tx1"/>
+                </a:solidFill>
+                <a:latin typeface="Bahnschrift" panose="020B0502040204020203" pitchFamily="34" charset="0"/>
+              </a:rPr>
+              <a:t>()</a:t>
+            </a:r>
+          </a:p>
+          <a:p>
+            <a:r>
+              <a:rPr lang="en-US" sz="800" dirty="0" err="1">
+                <a:solidFill>
+                  <a:schemeClr val="tx1"/>
+                </a:solidFill>
+                <a:latin typeface="Bahnschrift" panose="020B0502040204020203" pitchFamily="34" charset="0"/>
+              </a:rPr>
+              <a:t>updateScore</a:t>
+            </a:r>
+            <a:r>
+              <a:rPr lang="en-US" sz="800" dirty="0">
+                <a:solidFill>
+                  <a:schemeClr val="tx1"/>
+                </a:solidFill>
+                <a:latin typeface="Bahnschrift" panose="020B0502040204020203" pitchFamily="34" charset="0"/>
+              </a:rPr>
+              <a:t>()</a:t>
+            </a:r>
+          </a:p>
+          <a:p>
+            <a:r>
+              <a:rPr lang="en-US" sz="800" dirty="0" err="1">
+                <a:solidFill>
+                  <a:schemeClr val="tx1"/>
+                </a:solidFill>
+                <a:latin typeface="Bahnschrift" panose="020B0502040204020203" pitchFamily="34" charset="0"/>
+              </a:rPr>
+              <a:t>getGameMatrix</a:t>
+            </a:r>
+            <a:r>
+              <a:rPr lang="en-US" sz="800" dirty="0">
+                <a:solidFill>
+                  <a:schemeClr val="tx1"/>
+                </a:solidFill>
+                <a:latin typeface="Bahnschrift" panose="020B0502040204020203" pitchFamily="34" charset="0"/>
+              </a:rPr>
+              <a:t>()</a:t>
+            </a:r>
+          </a:p>
+        </p:txBody>
+      </p:sp>
+      <p:sp>
+        <p:nvSpPr>
+          <p:cNvPr id="71" name="Rectangle 70">
+            <a:extLst>
+              <a:ext uri="{FF2B5EF4-FFF2-40B4-BE49-F238E27FC236}">
+                <a16:creationId xmlns:a16="http://schemas.microsoft.com/office/drawing/2014/main" id="{431CE56B-CD32-4D2A-ADEE-EFC63CF269B9}"/>
+              </a:ext>
+            </a:extLst>
+          </p:cNvPr>
+          <p:cNvSpPr/>
+          <p:nvPr/>
+        </p:nvSpPr>
+        <p:spPr>
+          <a:xfrm>
+            <a:off x="3590370" y="4907001"/>
+            <a:ext cx="1222213" cy="480343"/>
+          </a:xfrm>
+          <a:prstGeom prst="rect">
+            <a:avLst/>
+          </a:prstGeom>
+          <a:noFill/>
+          <a:ln>
+            <a:noFill/>
+          </a:ln>
+        </p:spPr>
+        <p:style>
+          <a:lnRef idx="2">
+            <a:schemeClr val="accent1">
+              <a:shade val="50000"/>
+            </a:schemeClr>
+          </a:lnRef>
+          <a:fillRef idx="1">
+            <a:schemeClr val="accent1"/>
+          </a:fillRef>
+          <a:effectRef idx="0">
+            <a:schemeClr val="accent1"/>
+          </a:effectRef>
+          <a:fontRef idx="minor">
+            <a:schemeClr val="lt1"/>
+          </a:fontRef>
+        </p:style>
+        <p:txBody>
+          <a:bodyPr rtlCol="0" anchor="t"/>
+          <a:lstStyle/>
+          <a:p>
+            <a:r>
+              <a:rPr lang="en-US" sz="800" dirty="0" err="1">
+                <a:solidFill>
+                  <a:schemeClr val="tx1"/>
+                </a:solidFill>
+                <a:latin typeface="Bahnschrift" panose="020B0502040204020203" pitchFamily="34" charset="0"/>
+              </a:rPr>
+              <a:t>updateStaticMatrix</a:t>
+            </a:r>
+            <a:r>
+              <a:rPr lang="en-US" sz="800" dirty="0">
+                <a:solidFill>
+                  <a:schemeClr val="tx1"/>
+                </a:solidFill>
+                <a:latin typeface="Bahnschrift" panose="020B0502040204020203" pitchFamily="34" charset="0"/>
+              </a:rPr>
+              <a:t>()</a:t>
+            </a:r>
+          </a:p>
+        </p:txBody>
+      </p:sp>
+      <p:sp>
+        <p:nvSpPr>
+          <p:cNvPr id="75" name="Rectangle 74">
+            <a:extLst>
+              <a:ext uri="{FF2B5EF4-FFF2-40B4-BE49-F238E27FC236}">
+                <a16:creationId xmlns:a16="http://schemas.microsoft.com/office/drawing/2014/main" id="{F5C1B36D-3B3C-4007-ACCA-0BA5FAE5F4C6}"/>
+              </a:ext>
+            </a:extLst>
+          </p:cNvPr>
+          <p:cNvSpPr/>
+          <p:nvPr/>
+        </p:nvSpPr>
+        <p:spPr>
+          <a:xfrm>
+            <a:off x="1239268" y="4904323"/>
+            <a:ext cx="1403997" cy="480343"/>
+          </a:xfrm>
+          <a:prstGeom prst="rect">
+            <a:avLst/>
+          </a:prstGeom>
+          <a:noFill/>
+          <a:ln>
+            <a:noFill/>
+          </a:ln>
+        </p:spPr>
+        <p:style>
+          <a:lnRef idx="2">
+            <a:schemeClr val="accent1">
+              <a:shade val="50000"/>
+            </a:schemeClr>
+          </a:lnRef>
+          <a:fillRef idx="1">
+            <a:schemeClr val="accent1"/>
+          </a:fillRef>
+          <a:effectRef idx="0">
+            <a:schemeClr val="accent1"/>
+          </a:effectRef>
+          <a:fontRef idx="minor">
+            <a:schemeClr val="lt1"/>
+          </a:fontRef>
+        </p:style>
+        <p:txBody>
+          <a:bodyPr rtlCol="0" anchor="t"/>
+          <a:lstStyle/>
+          <a:p>
+            <a:r>
+              <a:rPr lang="en-US" sz="800" dirty="0" err="1">
+                <a:solidFill>
+                  <a:schemeClr val="tx1"/>
+                </a:solidFill>
+                <a:latin typeface="Bahnschrift" panose="020B0502040204020203" pitchFamily="34" charset="0"/>
+              </a:rPr>
+              <a:t>updatePosition</a:t>
+            </a:r>
+            <a:r>
+              <a:rPr lang="en-US" sz="800" dirty="0">
+                <a:solidFill>
+                  <a:schemeClr val="tx1"/>
+                </a:solidFill>
+                <a:latin typeface="Bahnschrift" panose="020B0502040204020203" pitchFamily="34" charset="0"/>
+              </a:rPr>
+              <a:t>()</a:t>
+            </a:r>
+          </a:p>
+        </p:txBody>
+      </p:sp>
+      <p:sp>
+        <p:nvSpPr>
+          <p:cNvPr id="77" name="Rectangle 76">
+            <a:extLst>
+              <a:ext uri="{FF2B5EF4-FFF2-40B4-BE49-F238E27FC236}">
+                <a16:creationId xmlns:a16="http://schemas.microsoft.com/office/drawing/2014/main" id="{54FEAA3E-47D9-4969-9CC3-45095E03529F}"/>
+              </a:ext>
+            </a:extLst>
+          </p:cNvPr>
+          <p:cNvSpPr/>
+          <p:nvPr/>
+        </p:nvSpPr>
+        <p:spPr>
+          <a:xfrm>
+            <a:off x="8345010" y="3622951"/>
+            <a:ext cx="1222213" cy="383343"/>
+          </a:xfrm>
+          <a:prstGeom prst="rect">
+            <a:avLst/>
+          </a:prstGeom>
+          <a:noFill/>
+          <a:ln>
+            <a:noFill/>
+          </a:ln>
+        </p:spPr>
+        <p:style>
+          <a:lnRef idx="2">
+            <a:schemeClr val="accent1">
+              <a:shade val="50000"/>
+            </a:schemeClr>
+          </a:lnRef>
+          <a:fillRef idx="1">
+            <a:schemeClr val="accent1"/>
+          </a:fillRef>
+          <a:effectRef idx="0">
+            <a:schemeClr val="accent1"/>
+          </a:effectRef>
+          <a:fontRef idx="minor">
+            <a:schemeClr val="lt1"/>
+          </a:fontRef>
+        </p:style>
+        <p:txBody>
+          <a:bodyPr rtlCol="0" anchor="t"/>
+          <a:lstStyle/>
+          <a:p>
+            <a:r>
+              <a:rPr lang="en-US" sz="800" dirty="0">
+                <a:solidFill>
+                  <a:schemeClr val="tx1"/>
+                </a:solidFill>
+                <a:latin typeface="Bahnschrift" panose="020B0502040204020203" pitchFamily="34" charset="0"/>
+              </a:rPr>
+              <a:t>save()</a:t>
+            </a:r>
+          </a:p>
+          <a:p>
+            <a:r>
+              <a:rPr lang="en-US" sz="800" dirty="0">
+                <a:solidFill>
+                  <a:schemeClr val="tx1"/>
+                </a:solidFill>
+                <a:latin typeface="Bahnschrift" panose="020B0502040204020203" pitchFamily="34" charset="0"/>
+              </a:rPr>
+              <a:t>load()</a:t>
+            </a:r>
+          </a:p>
+          <a:p>
+            <a:r>
+              <a:rPr lang="en-US" sz="800" dirty="0">
+                <a:solidFill>
+                  <a:schemeClr val="tx1"/>
+                </a:solidFill>
+                <a:latin typeface="Bahnschrift" panose="020B0502040204020203" pitchFamily="34" charset="0"/>
+              </a:rPr>
+              <a:t>reset()</a:t>
+            </a:r>
+          </a:p>
+        </p:txBody>
+      </p:sp>
+    </p:spTree>
+    <p:extLst>
+      <p:ext uri="{BB962C8B-B14F-4D97-AF65-F5344CB8AC3E}">
+        <p14:creationId xmlns:p14="http://schemas.microsoft.com/office/powerpoint/2010/main" val="1342257274"/>
+      </p:ext>
+    </p:extLst>
+  </p:cSld>
+  <p:clrMapOvr>
+    <a:masterClrMapping/>
+  </p:clrMapOvr>
+</p:sld>
+</file>
+
 <file path=ppt/theme/theme1.xml><?xml version="1.0" encoding="utf-8"?>
 <a:theme xmlns:a="http://schemas.openxmlformats.org/drawingml/2006/main" name="Thème Office">
   <a:themeElements>

</xml_diff>

<commit_message>
add rotateBlock methods to GenericBlock. Create associated verification test
</commit_message>
<xml_diff>
--- a/Readme/Illustrations/illustrations.pptx
+++ b/Readme/Illustrations/illustrations.pptx
@@ -263,7 +263,7 @@
           <a:p>
             <a:fld id="{98EA7AB4-7529-4827-90A7-5D29E852DD0A}" type="datetimeFigureOut">
               <a:rPr lang="en-US" smtClean="0"/>
-              <a:t>5/26/2020</a:t>
+              <a:t>5/27/2020</a:t>
             </a:fld>
             <a:endParaRPr lang="en-US"/>
           </a:p>
@@ -463,7 +463,7 @@
           <a:p>
             <a:fld id="{98EA7AB4-7529-4827-90A7-5D29E852DD0A}" type="datetimeFigureOut">
               <a:rPr lang="en-US" smtClean="0"/>
-              <a:t>5/26/2020</a:t>
+              <a:t>5/27/2020</a:t>
             </a:fld>
             <a:endParaRPr lang="en-US"/>
           </a:p>
@@ -673,7 +673,7 @@
           <a:p>
             <a:fld id="{98EA7AB4-7529-4827-90A7-5D29E852DD0A}" type="datetimeFigureOut">
               <a:rPr lang="en-US" smtClean="0"/>
-              <a:t>5/26/2020</a:t>
+              <a:t>5/27/2020</a:t>
             </a:fld>
             <a:endParaRPr lang="en-US"/>
           </a:p>
@@ -873,7 +873,7 @@
           <a:p>
             <a:fld id="{98EA7AB4-7529-4827-90A7-5D29E852DD0A}" type="datetimeFigureOut">
               <a:rPr lang="en-US" smtClean="0"/>
-              <a:t>5/26/2020</a:t>
+              <a:t>5/27/2020</a:t>
             </a:fld>
             <a:endParaRPr lang="en-US"/>
           </a:p>
@@ -1149,7 +1149,7 @@
           <a:p>
             <a:fld id="{98EA7AB4-7529-4827-90A7-5D29E852DD0A}" type="datetimeFigureOut">
               <a:rPr lang="en-US" smtClean="0"/>
-              <a:t>5/26/2020</a:t>
+              <a:t>5/27/2020</a:t>
             </a:fld>
             <a:endParaRPr lang="en-US"/>
           </a:p>
@@ -1417,7 +1417,7 @@
           <a:p>
             <a:fld id="{98EA7AB4-7529-4827-90A7-5D29E852DD0A}" type="datetimeFigureOut">
               <a:rPr lang="en-US" smtClean="0"/>
-              <a:t>5/26/2020</a:t>
+              <a:t>5/27/2020</a:t>
             </a:fld>
             <a:endParaRPr lang="en-US"/>
           </a:p>
@@ -1832,7 +1832,7 @@
           <a:p>
             <a:fld id="{98EA7AB4-7529-4827-90A7-5D29E852DD0A}" type="datetimeFigureOut">
               <a:rPr lang="en-US" smtClean="0"/>
-              <a:t>5/26/2020</a:t>
+              <a:t>5/27/2020</a:t>
             </a:fld>
             <a:endParaRPr lang="en-US"/>
           </a:p>
@@ -1974,7 +1974,7 @@
           <a:p>
             <a:fld id="{98EA7AB4-7529-4827-90A7-5D29E852DD0A}" type="datetimeFigureOut">
               <a:rPr lang="en-US" smtClean="0"/>
-              <a:t>5/26/2020</a:t>
+              <a:t>5/27/2020</a:t>
             </a:fld>
             <a:endParaRPr lang="en-US"/>
           </a:p>
@@ -2087,7 +2087,7 @@
           <a:p>
             <a:fld id="{98EA7AB4-7529-4827-90A7-5D29E852DD0A}" type="datetimeFigureOut">
               <a:rPr lang="en-US" smtClean="0"/>
-              <a:t>5/26/2020</a:t>
+              <a:t>5/27/2020</a:t>
             </a:fld>
             <a:endParaRPr lang="en-US"/>
           </a:p>
@@ -2400,7 +2400,7 @@
           <a:p>
             <a:fld id="{98EA7AB4-7529-4827-90A7-5D29E852DD0A}" type="datetimeFigureOut">
               <a:rPr lang="en-US" smtClean="0"/>
-              <a:t>5/26/2020</a:t>
+              <a:t>5/27/2020</a:t>
             </a:fld>
             <a:endParaRPr lang="en-US"/>
           </a:p>
@@ -2689,7 +2689,7 @@
           <a:p>
             <a:fld id="{98EA7AB4-7529-4827-90A7-5D29E852DD0A}" type="datetimeFigureOut">
               <a:rPr lang="en-US" smtClean="0"/>
-              <a:t>5/26/2020</a:t>
+              <a:t>5/27/2020</a:t>
             </a:fld>
             <a:endParaRPr lang="en-US"/>
           </a:p>
@@ -2932,7 +2932,7 @@
           <a:p>
             <a:fld id="{98EA7AB4-7529-4827-90A7-5D29E852DD0A}" type="datetimeFigureOut">
               <a:rPr lang="en-US" smtClean="0"/>
-              <a:t>5/26/2020</a:t>
+              <a:t>5/27/2020</a:t>
             </a:fld>
             <a:endParaRPr lang="en-US"/>
           </a:p>
@@ -8807,7 +8807,7 @@
         </p:nvSpPr>
         <p:spPr>
           <a:xfrm>
-            <a:off x="3606653" y="5626832"/>
+            <a:off x="3351215" y="5583810"/>
             <a:ext cx="678782" cy="383343"/>
           </a:xfrm>
           <a:prstGeom prst="rect">
@@ -8874,7 +8874,7 @@
         </p:nvSpPr>
         <p:spPr>
           <a:xfrm>
-            <a:off x="1493051" y="5637313"/>
+            <a:off x="1527535" y="5583810"/>
             <a:ext cx="678782" cy="383343"/>
           </a:xfrm>
           <a:prstGeom prst="rect">
@@ -10507,7 +10507,7 @@
         </p:nvSpPr>
         <p:spPr>
           <a:xfrm>
-            <a:off x="2437751" y="6084202"/>
+            <a:off x="1409815" y="6225603"/>
             <a:ext cx="1481855" cy="718860"/>
           </a:xfrm>
           <a:prstGeom prst="rect">
@@ -10561,6 +10561,85 @@
           </a:p>
         </p:txBody>
       </p:sp>
+      <p:cxnSp>
+        <p:nvCxnSpPr>
+          <p:cNvPr id="3" name="Connecteur droit avec flèche 2">
+            <a:extLst>
+              <a:ext uri="{FF2B5EF4-FFF2-40B4-BE49-F238E27FC236}">
+                <a16:creationId xmlns:a16="http://schemas.microsoft.com/office/drawing/2014/main" id="{E320BF59-F077-4A9D-81C0-79EB4F0E09BA}"/>
+              </a:ext>
+            </a:extLst>
+          </p:cNvPr>
+          <p:cNvCxnSpPr/>
+          <p:nvPr/>
+        </p:nvCxnSpPr>
+        <p:spPr>
+          <a:xfrm>
+            <a:off x="2467992" y="5397623"/>
+            <a:ext cx="0" cy="825624"/>
+          </a:xfrm>
+          <a:prstGeom prst="straightConnector1">
+            <a:avLst/>
+          </a:prstGeom>
+          <a:ln>
+            <a:tailEnd type="triangle"/>
+          </a:ln>
+        </p:spPr>
+        <p:style>
+          <a:lnRef idx="1">
+            <a:schemeClr val="accent1"/>
+          </a:lnRef>
+          <a:fillRef idx="0">
+            <a:schemeClr val="accent1"/>
+          </a:fillRef>
+          <a:effectRef idx="0">
+            <a:schemeClr val="accent1"/>
+          </a:effectRef>
+          <a:fontRef idx="minor">
+            <a:schemeClr val="tx1"/>
+          </a:fontRef>
+        </p:style>
+      </p:cxnSp>
+      <p:cxnSp>
+        <p:nvCxnSpPr>
+          <p:cNvPr id="27" name="Connecteur : en angle 26">
+            <a:extLst>
+              <a:ext uri="{FF2B5EF4-FFF2-40B4-BE49-F238E27FC236}">
+                <a16:creationId xmlns:a16="http://schemas.microsoft.com/office/drawing/2014/main" id="{E481A581-D15A-47B8-9C21-2FAD14FC974A}"/>
+              </a:ext>
+            </a:extLst>
+          </p:cNvPr>
+          <p:cNvCxnSpPr>
+            <a:cxnSpLocks/>
+            <a:stCxn id="71" idx="2"/>
+            <a:endCxn id="44" idx="3"/>
+          </p:cNvCxnSpPr>
+          <p:nvPr/>
+        </p:nvCxnSpPr>
+        <p:spPr>
+          <a:xfrm rot="5400000">
+            <a:off x="2947730" y="5331285"/>
+            <a:ext cx="1197689" cy="1309807"/>
+          </a:xfrm>
+          <a:prstGeom prst="bentConnector2">
+            <a:avLst/>
+          </a:prstGeom>
+        </p:spPr>
+        <p:style>
+          <a:lnRef idx="1">
+            <a:schemeClr val="accent1"/>
+          </a:lnRef>
+          <a:fillRef idx="0">
+            <a:schemeClr val="accent1"/>
+          </a:fillRef>
+          <a:effectRef idx="0">
+            <a:schemeClr val="accent1"/>
+          </a:effectRef>
+          <a:fontRef idx="minor">
+            <a:schemeClr val="tx1"/>
+          </a:fontRef>
+        </p:style>
+      </p:cxnSp>
     </p:spTree>
     <p:extLst>
       <p:ext uri="{BB962C8B-B14F-4D97-AF65-F5344CB8AC3E}">

</xml_diff>

<commit_message>
add GameManager::verifyCurrentBlockMatrix to avoid block clipping on the sides - included during rotation
</commit_message>
<xml_diff>
--- a/Readme/Illustrations/illustrations.pptx
+++ b/Readme/Illustrations/illustrations.pptx
@@ -263,7 +263,7 @@
           <a:p>
             <a:fld id="{98EA7AB4-7529-4827-90A7-5D29E852DD0A}" type="datetimeFigureOut">
               <a:rPr lang="en-US" smtClean="0"/>
-              <a:t>5/27/2020</a:t>
+              <a:t>5/28/2020</a:t>
             </a:fld>
             <a:endParaRPr lang="en-US"/>
           </a:p>
@@ -463,7 +463,7 @@
           <a:p>
             <a:fld id="{98EA7AB4-7529-4827-90A7-5D29E852DD0A}" type="datetimeFigureOut">
               <a:rPr lang="en-US" smtClean="0"/>
-              <a:t>5/27/2020</a:t>
+              <a:t>5/28/2020</a:t>
             </a:fld>
             <a:endParaRPr lang="en-US"/>
           </a:p>
@@ -673,7 +673,7 @@
           <a:p>
             <a:fld id="{98EA7AB4-7529-4827-90A7-5D29E852DD0A}" type="datetimeFigureOut">
               <a:rPr lang="en-US" smtClean="0"/>
-              <a:t>5/27/2020</a:t>
+              <a:t>5/28/2020</a:t>
             </a:fld>
             <a:endParaRPr lang="en-US"/>
           </a:p>
@@ -873,7 +873,7 @@
           <a:p>
             <a:fld id="{98EA7AB4-7529-4827-90A7-5D29E852DD0A}" type="datetimeFigureOut">
               <a:rPr lang="en-US" smtClean="0"/>
-              <a:t>5/27/2020</a:t>
+              <a:t>5/28/2020</a:t>
             </a:fld>
             <a:endParaRPr lang="en-US"/>
           </a:p>
@@ -1149,7 +1149,7 @@
           <a:p>
             <a:fld id="{98EA7AB4-7529-4827-90A7-5D29E852DD0A}" type="datetimeFigureOut">
               <a:rPr lang="en-US" smtClean="0"/>
-              <a:t>5/27/2020</a:t>
+              <a:t>5/28/2020</a:t>
             </a:fld>
             <a:endParaRPr lang="en-US"/>
           </a:p>
@@ -1417,7 +1417,7 @@
           <a:p>
             <a:fld id="{98EA7AB4-7529-4827-90A7-5D29E852DD0A}" type="datetimeFigureOut">
               <a:rPr lang="en-US" smtClean="0"/>
-              <a:t>5/27/2020</a:t>
+              <a:t>5/28/2020</a:t>
             </a:fld>
             <a:endParaRPr lang="en-US"/>
           </a:p>
@@ -1832,7 +1832,7 @@
           <a:p>
             <a:fld id="{98EA7AB4-7529-4827-90A7-5D29E852DD0A}" type="datetimeFigureOut">
               <a:rPr lang="en-US" smtClean="0"/>
-              <a:t>5/27/2020</a:t>
+              <a:t>5/28/2020</a:t>
             </a:fld>
             <a:endParaRPr lang="en-US"/>
           </a:p>
@@ -1974,7 +1974,7 @@
           <a:p>
             <a:fld id="{98EA7AB4-7529-4827-90A7-5D29E852DD0A}" type="datetimeFigureOut">
               <a:rPr lang="en-US" smtClean="0"/>
-              <a:t>5/27/2020</a:t>
+              <a:t>5/28/2020</a:t>
             </a:fld>
             <a:endParaRPr lang="en-US"/>
           </a:p>
@@ -2087,7 +2087,7 @@
           <a:p>
             <a:fld id="{98EA7AB4-7529-4827-90A7-5D29E852DD0A}" type="datetimeFigureOut">
               <a:rPr lang="en-US" smtClean="0"/>
-              <a:t>5/27/2020</a:t>
+              <a:t>5/28/2020</a:t>
             </a:fld>
             <a:endParaRPr lang="en-US"/>
           </a:p>
@@ -2400,7 +2400,7 @@
           <a:p>
             <a:fld id="{98EA7AB4-7529-4827-90A7-5D29E852DD0A}" type="datetimeFigureOut">
               <a:rPr lang="en-US" smtClean="0"/>
-              <a:t>5/27/2020</a:t>
+              <a:t>5/28/2020</a:t>
             </a:fld>
             <a:endParaRPr lang="en-US"/>
           </a:p>
@@ -2689,7 +2689,7 @@
           <a:p>
             <a:fld id="{98EA7AB4-7529-4827-90A7-5D29E852DD0A}" type="datetimeFigureOut">
               <a:rPr lang="en-US" smtClean="0"/>
-              <a:t>5/27/2020</a:t>
+              <a:t>5/28/2020</a:t>
             </a:fld>
             <a:endParaRPr lang="en-US"/>
           </a:p>
@@ -2932,7 +2932,7 @@
           <a:p>
             <a:fld id="{98EA7AB4-7529-4827-90A7-5D29E852DD0A}" type="datetimeFigureOut">
               <a:rPr lang="en-US" smtClean="0"/>
-              <a:t>5/27/2020</a:t>
+              <a:t>5/28/2020</a:t>
             </a:fld>
             <a:endParaRPr lang="en-US"/>
           </a:p>
@@ -9880,26 +9880,6 @@
           </a:p>
           <a:p>
             <a:r>
-              <a:rPr lang="en-US" sz="800" dirty="0" err="1">
-                <a:solidFill>
-                  <a:schemeClr val="tx1"/>
-                </a:solidFill>
-                <a:latin typeface="Bahnschrift" panose="020B0502040204020203" pitchFamily="34" charset="0"/>
-              </a:rPr>
-              <a:t>goToNextTick</a:t>
-            </a:r>
-            <a:r>
-              <a:rPr lang="en-US" sz="800" dirty="0">
-                <a:solidFill>
-                  <a:schemeClr val="tx1"/>
-                </a:solidFill>
-                <a:latin typeface="Bahnschrift" panose="020B0502040204020203" pitchFamily="34" charset="0"/>
-              </a:rPr>
-              <a:t>()</a:t>
-            </a:r>
-          </a:p>
-          <a:p>
-            <a:r>
               <a:rPr lang="en-US" sz="800" dirty="0">
                 <a:solidFill>
                   <a:schemeClr val="tx1"/>
@@ -10268,6 +10248,34 @@
               </a:rPr>
               <a:t>()</a:t>
             </a:r>
+          </a:p>
+          <a:p>
+            <a:r>
+              <a:rPr lang="en-US" sz="800" dirty="0" err="1">
+                <a:solidFill>
+                  <a:schemeClr val="tx1"/>
+                </a:solidFill>
+                <a:latin typeface="Bahnschrift" panose="020B0502040204020203" pitchFamily="34" charset="0"/>
+              </a:rPr>
+              <a:t>goToNextTick</a:t>
+            </a:r>
+            <a:r>
+              <a:rPr lang="en-US" sz="800" dirty="0">
+                <a:solidFill>
+                  <a:schemeClr val="tx1"/>
+                </a:solidFill>
+                <a:latin typeface="Bahnschrift" panose="020B0502040204020203" pitchFamily="34" charset="0"/>
+              </a:rPr>
+              <a:t>()</a:t>
+            </a:r>
+          </a:p>
+          <a:p>
+            <a:endParaRPr lang="en-US" sz="800" dirty="0">
+              <a:solidFill>
+                <a:schemeClr val="tx1"/>
+              </a:solidFill>
+              <a:latin typeface="Bahnschrift" panose="020B0502040204020203" pitchFamily="34" charset="0"/>
+            </a:endParaRPr>
           </a:p>
         </p:txBody>
       </p:sp>

</xml_diff>